<commit_message>
Small changes to introduction/objectives/architecture slides
</commit_message>
<xml_diff>
--- a/Seminar Presentation/Project Dome - Seminar Presentation.pptx
+++ b/Seminar Presentation/Project Dome - Seminar Presentation.pptx
@@ -233,7 +233,7 @@
           <a:p>
             <a:fld id="{FE5B4EDC-59C0-49C7-8ADA-5A781B329E02}" type="datetimeFigureOut">
               <a:rPr lang="en-US"/>
-              <a:t>10/9/2017</a:t>
+              <a:t>10/22/2017</a:t>
             </a:fld>
             <a:endParaRPr/>
           </a:p>
@@ -403,7 +403,7 @@
           <a:p>
             <a:fld id="{F2D8D46A-B586-417D-BFBD-8C8FE0AAF762}" type="datetimeFigureOut">
               <a:rPr lang="en-US"/>
-              <a:t>10/9/2017</a:t>
+              <a:t>10/22/2017</a:t>
             </a:fld>
             <a:endParaRPr/>
           </a:p>
@@ -742,7 +742,7 @@
           <p:cNvPr id="5" name="Header Placeholder 4">
             <a:extLst>
               <a:ext uri="{FF2B5EF4-FFF2-40B4-BE49-F238E27FC236}">
-                <a16:creationId xmlns:a16="http://schemas.microsoft.com/office/drawing/2014/main" xmlns="" id="{915156C4-EEB0-49B7-B828-E409C07530B8}"/>
+                <a16:creationId xmlns="" xmlns:a16="http://schemas.microsoft.com/office/drawing/2014/main" id="{915156C4-EEB0-49B7-B828-E409C07530B8}"/>
               </a:ext>
             </a:extLst>
           </p:cNvPr>
@@ -1534,7 +1534,7 @@
           <a:p>
             <a:fld id="{F0DFD029-FB74-4578-B929-F66AA97659CA}" type="datetimeFigureOut">
               <a:rPr lang="en-US"/>
-              <a:t>10/9/2017</a:t>
+              <a:t>10/22/2017</a:t>
             </a:fld>
             <a:endParaRPr/>
           </a:p>
@@ -1732,7 +1732,7 @@
           <a:p>
             <a:fld id="{F0DFD029-FB74-4578-B929-F66AA97659CA}" type="datetimeFigureOut">
               <a:rPr lang="en-US"/>
-              <a:t>10/9/2017</a:t>
+              <a:t>10/22/2017</a:t>
             </a:fld>
             <a:endParaRPr/>
           </a:p>
@@ -1940,7 +1940,7 @@
           <a:p>
             <a:fld id="{F0DFD029-FB74-4578-B929-F66AA97659CA}" type="datetimeFigureOut">
               <a:rPr lang="en-US"/>
-              <a:t>10/9/2017</a:t>
+              <a:t>10/22/2017</a:t>
             </a:fld>
             <a:endParaRPr/>
           </a:p>
@@ -2138,7 +2138,7 @@
           <a:p>
             <a:fld id="{F0DFD029-FB74-4578-B929-F66AA97659CA}" type="datetimeFigureOut">
               <a:rPr lang="en-US"/>
-              <a:t>10/9/2017</a:t>
+              <a:t>10/22/2017</a:t>
             </a:fld>
             <a:endParaRPr/>
           </a:p>
@@ -2570,7 +2570,7 @@
           <a:p>
             <a:fld id="{F0DFD029-FB74-4578-B929-F66AA97659CA}" type="datetimeFigureOut">
               <a:rPr lang="en-US"/>
-              <a:t>10/9/2017</a:t>
+              <a:t>10/22/2017</a:t>
             </a:fld>
             <a:endParaRPr/>
           </a:p>
@@ -2874,7 +2874,7 @@
           <a:p>
             <a:fld id="{F0DFD029-FB74-4578-B929-F66AA97659CA}" type="datetimeFigureOut">
               <a:rPr lang="en-US"/>
-              <a:t>10/9/2017</a:t>
+              <a:t>10/22/2017</a:t>
             </a:fld>
             <a:endParaRPr/>
           </a:p>
@@ -3330,7 +3330,7 @@
           <a:p>
             <a:fld id="{F0DFD029-FB74-4578-B929-F66AA97659CA}" type="datetimeFigureOut">
               <a:rPr lang="en-US"/>
-              <a:t>10/9/2017</a:t>
+              <a:t>10/22/2017</a:t>
             </a:fld>
             <a:endParaRPr/>
           </a:p>
@@ -3460,7 +3460,7 @@
           <a:p>
             <a:fld id="{F0DFD029-FB74-4578-B929-F66AA97659CA}" type="datetimeFigureOut">
               <a:rPr lang="en-US"/>
-              <a:t>10/9/2017</a:t>
+              <a:t>10/22/2017</a:t>
             </a:fld>
             <a:endParaRPr/>
           </a:p>
@@ -3567,7 +3567,7 @@
           <a:p>
             <a:fld id="{F0DFD029-FB74-4578-B929-F66AA97659CA}" type="datetimeFigureOut">
               <a:rPr lang="en-US"/>
-              <a:t>10/9/2017</a:t>
+              <a:t>10/22/2017</a:t>
             </a:fld>
             <a:endParaRPr/>
           </a:p>
@@ -3866,7 +3866,7 @@
           <a:p>
             <a:fld id="{F0DFD029-FB74-4578-B929-F66AA97659CA}" type="datetimeFigureOut">
               <a:rPr lang="en-US"/>
-              <a:t>10/9/2017</a:t>
+              <a:t>10/22/2017</a:t>
             </a:fld>
             <a:endParaRPr/>
           </a:p>
@@ -4154,7 +4154,7 @@
           <a:p>
             <a:fld id="{F0DFD029-FB74-4578-B929-F66AA97659CA}" type="datetimeFigureOut">
               <a:rPr lang="en-US"/>
-              <a:t>10/9/2017</a:t>
+              <a:t>10/22/2017</a:t>
             </a:fld>
             <a:endParaRPr/>
           </a:p>
@@ -4777,7 +4777,7 @@
             <a:fld id="{F0DFD029-FB74-4578-B929-F66AA97659CA}" type="datetimeFigureOut">
               <a:rPr lang="en-US"/>
               <a:pPr/>
-              <a:t>10/9/2017</a:t>
+              <a:t>10/22/2017</a:t>
             </a:fld>
             <a:endParaRPr/>
           </a:p>
@@ -5303,7 +5303,7 @@
           <p:cNvPr id="3" name="TextBox 2">
             <a:extLst>
               <a:ext uri="{FF2B5EF4-FFF2-40B4-BE49-F238E27FC236}">
-                <a16:creationId xmlns:a16="http://schemas.microsoft.com/office/drawing/2014/main" xmlns="" id="{D9C0AB7A-FB2A-4875-A4DA-C84741285C23}"/>
+                <a16:creationId xmlns="" xmlns:a16="http://schemas.microsoft.com/office/drawing/2014/main" id="{D9C0AB7A-FB2A-4875-A4DA-C84741285C23}"/>
               </a:ext>
             </a:extLst>
           </p:cNvPr>
@@ -5342,7 +5342,7 @@
           <p:cNvPr id="6" name="Picture 5">
             <a:extLst>
               <a:ext uri="{FF2B5EF4-FFF2-40B4-BE49-F238E27FC236}">
-                <a16:creationId xmlns:a16="http://schemas.microsoft.com/office/drawing/2014/main" xmlns="" id="{B84BA912-6500-4427-8B0E-73F53ECE2C4C}"/>
+                <a16:creationId xmlns="" xmlns:a16="http://schemas.microsoft.com/office/drawing/2014/main" id="{B84BA912-6500-4427-8B0E-73F53ECE2C4C}"/>
               </a:ext>
             </a:extLst>
           </p:cNvPr>
@@ -5378,7 +5378,7 @@
           <p:cNvPr id="7" name="TextBox 6">
             <a:extLst>
               <a:ext uri="{FF2B5EF4-FFF2-40B4-BE49-F238E27FC236}">
-                <a16:creationId xmlns:a16="http://schemas.microsoft.com/office/drawing/2014/main" xmlns="" id="{50DEA232-9462-4BC3-ADF1-0ADFF9EEF593}"/>
+                <a16:creationId xmlns="" xmlns:a16="http://schemas.microsoft.com/office/drawing/2014/main" id="{50DEA232-9462-4BC3-ADF1-0ADFF9EEF593}"/>
               </a:ext>
             </a:extLst>
           </p:cNvPr>
@@ -5415,7 +5415,7 @@
           <p:cNvPr id="8" name="TextBox 7">
             <a:extLst>
               <a:ext uri="{FF2B5EF4-FFF2-40B4-BE49-F238E27FC236}">
-                <a16:creationId xmlns:a16="http://schemas.microsoft.com/office/drawing/2014/main" xmlns="" id="{475A23A9-EDAE-4B56-B849-3DFCD00BDFB6}"/>
+                <a16:creationId xmlns="" xmlns:a16="http://schemas.microsoft.com/office/drawing/2014/main" id="{475A23A9-EDAE-4B56-B849-3DFCD00BDFB6}"/>
               </a:ext>
             </a:extLst>
           </p:cNvPr>
@@ -5567,8 +5567,29 @@
               <a:rPr lang="en-IE" sz="2000" dirty="0">
                 <a:latin typeface="Consolas" panose="020B0609020204030204" pitchFamily="49" charset="0"/>
               </a:rPr>
-              <a:t>that either will explain part of the story or will be required in order to solve some puzzles. Interacting with different elements of the scenario, as well as other characters will give the player information about how to achieve his goals. This project, as proof of concept, will only have a few scenarios but we pretend to fully implement the mechanics for the game to be playable.</a:t>
-            </a:r>
+              <a:t>that either will explain part of the story or will be required in order to solve some puzzles. Interacting with different elements of the scenario, as well as other characters will give the player information about how to achieve his goals. This project, as proof of concept, will only have a few scenarios but we </a:t>
+            </a:r>
+            <a:r>
+              <a:rPr lang="en-IE" sz="2000" dirty="0" smtClean="0">
+                <a:latin typeface="Consolas" panose="020B0609020204030204" pitchFamily="49" charset="0"/>
+              </a:rPr>
+              <a:t>intend to </a:t>
+            </a:r>
+            <a:r>
+              <a:rPr lang="en-IE" sz="2000" dirty="0">
+                <a:latin typeface="Consolas" panose="020B0609020204030204" pitchFamily="49" charset="0"/>
+              </a:rPr>
+              <a:t>fully implement the mechanics for the game to be </a:t>
+            </a:r>
+            <a:r>
+              <a:rPr lang="en-IE" sz="2000" dirty="0" smtClean="0">
+                <a:latin typeface="Consolas" panose="020B0609020204030204" pitchFamily="49" charset="0"/>
+              </a:rPr>
+              <a:t>playable in both single and multiplayer modes.</a:t>
+            </a:r>
+            <a:endParaRPr lang="en-IE" sz="2000" dirty="0">
+              <a:latin typeface="Consolas" panose="020B0609020204030204" pitchFamily="49" charset="0"/>
+            </a:endParaRPr>
           </a:p>
           <a:p>
             <a:pPr marL="0" indent="0">
@@ -5583,7 +5604,7 @@
           <p:cNvPr id="5" name="Picture 4">
             <a:extLst>
               <a:ext uri="{FF2B5EF4-FFF2-40B4-BE49-F238E27FC236}">
-                <a16:creationId xmlns:a16="http://schemas.microsoft.com/office/drawing/2014/main" xmlns="" id="{C2398B9A-C44E-45A5-9731-B5E07FEAA816}"/>
+                <a16:creationId xmlns="" xmlns:a16="http://schemas.microsoft.com/office/drawing/2014/main" id="{C2398B9A-C44E-45A5-9731-B5E07FEAA816}"/>
               </a:ext>
             </a:extLst>
           </p:cNvPr>
@@ -5686,7 +5707,7 @@
           <p:cNvPr id="2" name="Content Placeholder 1">
             <a:extLst>
               <a:ext uri="{FF2B5EF4-FFF2-40B4-BE49-F238E27FC236}">
-                <a16:creationId xmlns:a16="http://schemas.microsoft.com/office/drawing/2014/main" xmlns="" id="{8952B9EB-7C7A-4881-8F5C-0B2EE859A78F}"/>
+                <a16:creationId xmlns="" xmlns:a16="http://schemas.microsoft.com/office/drawing/2014/main" id="{8952B9EB-7C7A-4881-8F5C-0B2EE859A78F}"/>
               </a:ext>
             </a:extLst>
           </p:cNvPr>
@@ -5716,15 +5737,24 @@
               <a:rPr lang="en-IE" sz="1800" dirty="0">
                 <a:latin typeface="Consolas" panose="020B0609020204030204" pitchFamily="49" charset="0"/>
               </a:rPr>
-              <a:t>UI design and implementation</a:t>
-            </a:r>
-          </a:p>
-          <a:p>
+              <a:t>UI design </a:t>
+            </a:r>
+            <a:endParaRPr lang="en-IE" sz="1800" dirty="0" smtClean="0">
+              <a:latin typeface="Consolas" panose="020B0609020204030204" pitchFamily="49" charset="0"/>
+            </a:endParaRPr>
+          </a:p>
+          <a:p>
+            <a:r>
+              <a:rPr lang="en-IE" sz="1800" dirty="0" smtClean="0">
+                <a:latin typeface="Consolas" panose="020B0609020204030204" pitchFamily="49" charset="0"/>
+              </a:rPr>
+              <a:t>Interaction </a:t>
+            </a:r>
             <a:r>
               <a:rPr lang="en-IE" sz="1800" dirty="0">
                 <a:latin typeface="Consolas" panose="020B0609020204030204" pitchFamily="49" charset="0"/>
               </a:rPr>
-              <a:t>Interaction with the scenario / NPC’s</a:t>
+              <a:t>with the scenario / NPC’s</a:t>
             </a:r>
           </a:p>
           <a:p>
@@ -5770,7 +5800,7 @@
           <p:cNvPr id="6" name="Picture 5">
             <a:extLst>
               <a:ext uri="{FF2B5EF4-FFF2-40B4-BE49-F238E27FC236}">
-                <a16:creationId xmlns:a16="http://schemas.microsoft.com/office/drawing/2014/main" xmlns="" id="{28F5288F-00A0-4BBD-83A2-A3DFDBCF03BA}"/>
+                <a16:creationId xmlns="" xmlns:a16="http://schemas.microsoft.com/office/drawing/2014/main" id="{28F5288F-00A0-4BBD-83A2-A3DFDBCF03BA}"/>
               </a:ext>
             </a:extLst>
           </p:cNvPr>
@@ -5848,7 +5878,7 @@
           <p:cNvPr id="16" name="Picture 15">
             <a:extLst>
               <a:ext uri="{FF2B5EF4-FFF2-40B4-BE49-F238E27FC236}">
-                <a16:creationId xmlns:a16="http://schemas.microsoft.com/office/drawing/2014/main" xmlns="" id="{2C6AD206-9B86-4D0B-9F1E-DA41DD3A38BF}"/>
+                <a16:creationId xmlns="" xmlns:a16="http://schemas.microsoft.com/office/drawing/2014/main" id="{2C6AD206-9B86-4D0B-9F1E-DA41DD3A38BF}"/>
               </a:ext>
             </a:extLst>
           </p:cNvPr>
@@ -5884,7 +5914,7 @@
           <p:cNvPr id="22" name="Picture 21">
             <a:extLst>
               <a:ext uri="{FF2B5EF4-FFF2-40B4-BE49-F238E27FC236}">
-                <a16:creationId xmlns:a16="http://schemas.microsoft.com/office/drawing/2014/main" xmlns="" id="{8A0BA9B8-D272-403E-BD08-5A2E9F78A6AB}"/>
+                <a16:creationId xmlns="" xmlns:a16="http://schemas.microsoft.com/office/drawing/2014/main" id="{8A0BA9B8-D272-403E-BD08-5A2E9F78A6AB}"/>
               </a:ext>
             </a:extLst>
           </p:cNvPr>
@@ -5920,7 +5950,7 @@
           <p:cNvPr id="24" name="Picture 23">
             <a:extLst>
               <a:ext uri="{FF2B5EF4-FFF2-40B4-BE49-F238E27FC236}">
-                <a16:creationId xmlns:a16="http://schemas.microsoft.com/office/drawing/2014/main" xmlns="" id="{2322AFEE-BCEB-49FE-9217-D468D94B2A7D}"/>
+                <a16:creationId xmlns="" xmlns:a16="http://schemas.microsoft.com/office/drawing/2014/main" id="{2322AFEE-BCEB-49FE-9217-D468D94B2A7D}"/>
               </a:ext>
             </a:extLst>
           </p:cNvPr>
@@ -5990,7 +6020,7 @@
           <p:cNvPr id="7" name="Picture 6">
             <a:extLst>
               <a:ext uri="{FF2B5EF4-FFF2-40B4-BE49-F238E27FC236}">
-                <a16:creationId xmlns:a16="http://schemas.microsoft.com/office/drawing/2014/main" xmlns="" id="{5D065A52-AAA4-4C01-8F65-E87E44A17B82}"/>
+                <a16:creationId xmlns="" xmlns:a16="http://schemas.microsoft.com/office/drawing/2014/main" id="{5D065A52-AAA4-4C01-8F65-E87E44A17B82}"/>
               </a:ext>
             </a:extLst>
           </p:cNvPr>
@@ -6023,10 +6053,10 @@
       </p:pic>
       <p:pic>
         <p:nvPicPr>
-          <p:cNvPr id="10" name="Picture 9">
+          <p:cNvPr id="12" name="Picture 11">
             <a:extLst>
               <a:ext uri="{FF2B5EF4-FFF2-40B4-BE49-F238E27FC236}">
-                <a16:creationId xmlns:a16="http://schemas.microsoft.com/office/drawing/2014/main" xmlns="" id="{2FF24EB8-9605-4D74-8883-D9680EAE4AB7}"/>
+                <a16:creationId xmlns="" xmlns:a16="http://schemas.microsoft.com/office/drawing/2014/main" id="{E02B3C64-D7DF-49E5-ABF2-6E0146B8DD5D}"/>
               </a:ext>
             </a:extLst>
           </p:cNvPr>
@@ -6049,80 +6079,8 @@
         </p:blipFill>
         <p:spPr>
           <a:xfrm>
-            <a:off x="8117652" y="4613772"/>
-            <a:ext cx="1622981" cy="1622981"/>
-          </a:xfrm>
-          <a:prstGeom prst="rect">
-            <a:avLst/>
-          </a:prstGeom>
-        </p:spPr>
-      </p:pic>
-      <p:pic>
-        <p:nvPicPr>
-          <p:cNvPr id="12" name="Picture 11">
-            <a:extLst>
-              <a:ext uri="{FF2B5EF4-FFF2-40B4-BE49-F238E27FC236}">
-                <a16:creationId xmlns:a16="http://schemas.microsoft.com/office/drawing/2014/main" xmlns="" id="{E02B3C64-D7DF-49E5-ABF2-6E0146B8DD5D}"/>
-              </a:ext>
-            </a:extLst>
-          </p:cNvPr>
-          <p:cNvPicPr>
-            <a:picLocks noChangeAspect="1"/>
-          </p:cNvPicPr>
-          <p:nvPr/>
-        </p:nvPicPr>
-        <p:blipFill>
-          <a:blip r:embed="rId7" cstate="print">
-            <a:extLst>
-              <a:ext uri="{28A0092B-C50C-407E-A947-70E740481C1C}">
-                <a14:useLocalDpi xmlns:a14="http://schemas.microsoft.com/office/drawing/2010/main" val="0"/>
-              </a:ext>
-            </a:extLst>
-          </a:blip>
-          <a:stretch>
-            <a:fillRect/>
-          </a:stretch>
-        </p:blipFill>
-        <p:spPr>
-          <a:xfrm>
-            <a:off x="10187373" y="3298641"/>
+            <a:off x="8244460" y="4708024"/>
             <a:ext cx="1081974" cy="1081974"/>
-          </a:xfrm>
-          <a:prstGeom prst="rect">
-            <a:avLst/>
-          </a:prstGeom>
-        </p:spPr>
-      </p:pic>
-      <p:pic>
-        <p:nvPicPr>
-          <p:cNvPr id="14" name="Picture 13">
-            <a:extLst>
-              <a:ext uri="{FF2B5EF4-FFF2-40B4-BE49-F238E27FC236}">
-                <a16:creationId xmlns:a16="http://schemas.microsoft.com/office/drawing/2014/main" xmlns="" id="{A3E869C1-5DD2-4FC5-8896-84456E1229CB}"/>
-              </a:ext>
-            </a:extLst>
-          </p:cNvPr>
-          <p:cNvPicPr>
-            <a:picLocks noChangeAspect="1"/>
-          </p:cNvPicPr>
-          <p:nvPr/>
-        </p:nvPicPr>
-        <p:blipFill>
-          <a:blip r:embed="rId8" cstate="print">
-            <a:extLst>
-              <a:ext uri="{28A0092B-C50C-407E-A947-70E740481C1C}">
-                <a14:useLocalDpi xmlns:a14="http://schemas.microsoft.com/office/drawing/2010/main" val="0"/>
-              </a:ext>
-            </a:extLst>
-          </a:blip>
-          <a:stretch>
-            <a:fillRect/>
-          </a:stretch>
-        </p:blipFill>
-        <p:spPr>
-          <a:xfrm>
-            <a:off x="10232116" y="4914113"/>
-            <a:ext cx="1070042" cy="1070042"/>
           </a:xfrm>
           <a:prstGeom prst="rect">
             <a:avLst/>
@@ -6134,7 +6092,7 @@
           <p:cNvPr id="18" name="Picture 17">
             <a:extLst>
               <a:ext uri="{FF2B5EF4-FFF2-40B4-BE49-F238E27FC236}">
-                <a16:creationId xmlns:a16="http://schemas.microsoft.com/office/drawing/2014/main" xmlns="" id="{B347D077-B069-4AD2-8808-6FC69518F487}"/>
+                <a16:creationId xmlns="" xmlns:a16="http://schemas.microsoft.com/office/drawing/2014/main" id="{B347D077-B069-4AD2-8808-6FC69518F487}"/>
               </a:ext>
             </a:extLst>
           </p:cNvPr>
@@ -6144,7 +6102,7 @@
           <p:nvPr/>
         </p:nvPicPr>
         <p:blipFill>
-          <a:blip r:embed="rId9">
+          <a:blip r:embed="rId7">
             <a:extLst>
               <a:ext uri="{28A0092B-C50C-407E-A947-70E740481C1C}">
                 <a14:useLocalDpi xmlns:a14="http://schemas.microsoft.com/office/drawing/2010/main" val="0"/>
@@ -6170,7 +6128,7 @@
           <p:cNvPr id="20" name="Picture 19">
             <a:extLst>
               <a:ext uri="{FF2B5EF4-FFF2-40B4-BE49-F238E27FC236}">
-                <a16:creationId xmlns:a16="http://schemas.microsoft.com/office/drawing/2014/main" xmlns="" id="{4B7380E6-8544-44D4-9AF2-CC1B527B1974}"/>
+                <a16:creationId xmlns="" xmlns:a16="http://schemas.microsoft.com/office/drawing/2014/main" id="{4B7380E6-8544-44D4-9AF2-CC1B527B1974}"/>
               </a:ext>
             </a:extLst>
           </p:cNvPr>
@@ -6180,7 +6138,7 @@
           <p:nvPr/>
         </p:nvPicPr>
         <p:blipFill>
-          <a:blip r:embed="rId10">
+          <a:blip r:embed="rId8">
             <a:extLst>
               <a:ext uri="{28A0092B-C50C-407E-A947-70E740481C1C}">
                 <a14:useLocalDpi xmlns:a14="http://schemas.microsoft.com/office/drawing/2010/main" val="0"/>
@@ -6206,7 +6164,7 @@
           <p:cNvPr id="25" name="TextBox 24">
             <a:extLst>
               <a:ext uri="{FF2B5EF4-FFF2-40B4-BE49-F238E27FC236}">
-                <a16:creationId xmlns:a16="http://schemas.microsoft.com/office/drawing/2014/main" xmlns="" id="{9E96A112-67F2-4BB3-BBFF-DB5C9A494FDA}"/>
+                <a16:creationId xmlns="" xmlns:a16="http://schemas.microsoft.com/office/drawing/2014/main" id="{9E96A112-67F2-4BB3-BBFF-DB5C9A494FDA}"/>
               </a:ext>
             </a:extLst>
           </p:cNvPr>
@@ -6241,7 +6199,7 @@
           <p:cNvPr id="26" name="TextBox 25">
             <a:extLst>
               <a:ext uri="{FF2B5EF4-FFF2-40B4-BE49-F238E27FC236}">
-                <a16:creationId xmlns:a16="http://schemas.microsoft.com/office/drawing/2014/main" xmlns="" id="{4FDB3261-5862-4C8B-BE73-1ACF1175BD41}"/>
+                <a16:creationId xmlns="" xmlns:a16="http://schemas.microsoft.com/office/drawing/2014/main" id="{4FDB3261-5862-4C8B-BE73-1ACF1175BD41}"/>
               </a:ext>
             </a:extLst>
           </p:cNvPr>
@@ -6377,7 +6335,7 @@
           <p:cNvPr id="7" name="Picture 6">
             <a:extLst>
               <a:ext uri="{FF2B5EF4-FFF2-40B4-BE49-F238E27FC236}">
-                <a16:creationId xmlns:a16="http://schemas.microsoft.com/office/drawing/2014/main" xmlns="" id="{D5E14DFF-90AE-4B67-83F3-32DC34898A34}"/>
+                <a16:creationId xmlns="" xmlns:a16="http://schemas.microsoft.com/office/drawing/2014/main" id="{D5E14DFF-90AE-4B67-83F3-32DC34898A34}"/>
               </a:ext>
             </a:extLst>
           </p:cNvPr>
@@ -7384,1043 +7342,12 @@
 </file>
 
 <file path=customXml/item1.xml><?xml version="1.0" encoding="utf-8"?>
-<ct:contentTypeSchema xmlns:ct="http://schemas.microsoft.com/office/2006/metadata/contentType" xmlns:ma="http://schemas.microsoft.com/office/2006/metadata/properties/metaAttributes" ct:_="" ma:_="" ma:contentTypeName="TemplateFile" ma:contentTypeID="0x0101006EDDDB5EE6D98C44930B742096920B300400F5B6D36B3EF94B4E9A635CDF2A18F5B8" ma:contentTypeVersion="72" ma:contentTypeDescription="Create a new document." ma:contentTypeScope="" ma:versionID="a23e56308344d904b51738559c3d67c9">
-  <xsd:schema xmlns:xsd="http://www.w3.org/2001/XMLSchema" xmlns:xs="http://www.w3.org/2001/XMLSchema" xmlns:p="http://schemas.microsoft.com/office/2006/metadata/properties" xmlns:ns2="4873beb7-5857-4685-be1f-d57550cc96cc" targetNamespace="http://schemas.microsoft.com/office/2006/metadata/properties" ma:root="true" ma:fieldsID="cd0908cc4600e77bf5da051303e00c8d" ns2:_="">
-    <xsd:import namespace="4873beb7-5857-4685-be1f-d57550cc96cc"/>
-    <xsd:element name="properties">
-      <xsd:complexType>
-        <xsd:sequence>
-          <xsd:element name="documentManagement">
-            <xsd:complexType>
-              <xsd:all>
-                <xsd:element ref="ns2:AcquiredFrom" minOccurs="0"/>
-                <xsd:element ref="ns2:UACurrentWords" minOccurs="0"/>
-                <xsd:element ref="ns2:TPApplication" minOccurs="0"/>
-                <xsd:element ref="ns2:ApprovalLog" minOccurs="0"/>
-                <xsd:element ref="ns2:ApprovalStatus" minOccurs="0"/>
-                <xsd:element ref="ns2:AssetStart" minOccurs="0"/>
-                <xsd:element ref="ns2:AssetExpire" minOccurs="0"/>
-                <xsd:element ref="ns2:AssetId" minOccurs="0"/>
-                <xsd:element ref="ns2:IsSearchable" minOccurs="0"/>
-                <xsd:element ref="ns2:AssetType" minOccurs="0"/>
-                <xsd:element ref="ns2:APAuthor" minOccurs="0"/>
-                <xsd:element ref="ns2:AverageRating" minOccurs="0"/>
-                <xsd:element ref="ns2:BlockPublish" minOccurs="0"/>
-                <xsd:element ref="ns2:BugNumber" minOccurs="0"/>
-                <xsd:element ref="ns2:CampaignTagsTaxHTField0" minOccurs="0"/>
-                <xsd:element ref="ns2:TPClientViewer" minOccurs="0"/>
-                <xsd:element ref="ns2:ClipArtFilename" minOccurs="0"/>
-                <xsd:element ref="ns2:TPCommandLine" minOccurs="0"/>
-                <xsd:element ref="ns2:TPComponent" minOccurs="0"/>
-                <xsd:element ref="ns2:ContentItem" minOccurs="0"/>
-                <xsd:element ref="ns2:CrawlForDependencies" minOccurs="0"/>
-                <xsd:element ref="ns2:CSXHash" minOccurs="0"/>
-                <xsd:element ref="ns2:CSXSubmissionMarket" minOccurs="0"/>
-                <xsd:element ref="ns2:CSXUpdate" minOccurs="0"/>
-                <xsd:element ref="ns2:IntlLangReviewDate" minOccurs="0"/>
-                <xsd:element ref="ns2:IsDeleted" minOccurs="0"/>
-                <xsd:element ref="ns2:APDescription" minOccurs="0"/>
-                <xsd:element ref="ns2:DirectSourceMarket" minOccurs="0"/>
-                <xsd:element ref="ns2:Downloads" minOccurs="0"/>
-                <xsd:element ref="ns2:DSATActionTaken" minOccurs="0"/>
-                <xsd:element ref="ns2:APEditor" minOccurs="0"/>
-                <xsd:element ref="ns2:EditorialStatus" minOccurs="0"/>
-                <xsd:element ref="ns2:EditorialTags" minOccurs="0"/>
-                <xsd:element ref="ns2:TPExecutable" minOccurs="0"/>
-                <xsd:element ref="ns2:FeatureTagsTaxHTField0" minOccurs="0"/>
-                <xsd:element ref="ns2:TPFriendlyName" minOccurs="0"/>
-                <xsd:element ref="ns2:FriendlyTitle" minOccurs="0"/>
-                <xsd:element ref="ns2:PrimaryImageGen" minOccurs="0"/>
-                <xsd:element ref="ns2:HandoffToMSDN" minOccurs="0"/>
-                <xsd:element ref="ns2:InProjectListLookup" minOccurs="0"/>
-                <xsd:element ref="ns2:TPInstallLocation" minOccurs="0"/>
-                <xsd:element ref="ns2:InternalTagsTaxHTField0" minOccurs="0"/>
-                <xsd:element ref="ns2:IntlLangReview" minOccurs="0"/>
-                <xsd:element ref="ns2:IntlLangReviewer" minOccurs="0"/>
-                <xsd:element ref="ns2:MarketSpecific" minOccurs="0"/>
-                <xsd:element ref="ns2:LastCompleteVersionLookup" minOccurs="0"/>
-                <xsd:element ref="ns2:LastHandOff" minOccurs="0"/>
-                <xsd:element ref="ns2:LastModifiedDateTime" minOccurs="0"/>
-                <xsd:element ref="ns2:LastPreviewErrorLookup" minOccurs="0"/>
-                <xsd:element ref="ns2:LastPreviewResultLookup" minOccurs="0"/>
-                <xsd:element ref="ns2:LastPreviewAttemptDateLookup" minOccurs="0"/>
-                <xsd:element ref="ns2:LastPreviewedByLookup" minOccurs="0"/>
-                <xsd:element ref="ns2:LastPreviewTimeLookup" minOccurs="0"/>
-                <xsd:element ref="ns2:LastPreviewVersionLookup" minOccurs="0"/>
-                <xsd:element ref="ns2:LastPublishErrorLookup" minOccurs="0"/>
-                <xsd:element ref="ns2:LastPublishResultLookup" minOccurs="0"/>
-                <xsd:element ref="ns2:LastPublishAttemptDateLookup" minOccurs="0"/>
-                <xsd:element ref="ns2:LastPublishedByLookup" minOccurs="0"/>
-                <xsd:element ref="ns2:LastPublishTimeLookup" minOccurs="0"/>
-                <xsd:element ref="ns2:LastPublishVersionLookup" minOccurs="0"/>
-                <xsd:element ref="ns2:TPLaunchHelpLinkType" minOccurs="0"/>
-                <xsd:element ref="ns2:LegacyData" minOccurs="0"/>
-                <xsd:element ref="ns2:TPLaunchHelpLink" minOccurs="0"/>
-                <xsd:element ref="ns2:LocComments" minOccurs="0"/>
-                <xsd:element ref="ns2:LocLastLocAttemptVersionLookup" minOccurs="0"/>
-                <xsd:element ref="ns2:LocLastLocAttemptVersionTypeLookup" minOccurs="0"/>
-                <xsd:element ref="ns2:LocManualTestRequired" minOccurs="0"/>
-                <xsd:element ref="ns2:LocMarketGroupTiers2" minOccurs="0"/>
-                <xsd:element ref="ns2:LocNewPublishedVersionLookup" minOccurs="0"/>
-                <xsd:element ref="ns2:LocOverallHandbackStatusLookup" minOccurs="0"/>
-                <xsd:element ref="ns2:LocOverallLocStatusLookup" minOccurs="0"/>
-                <xsd:element ref="ns2:LocOverallPreviewStatusLookup" minOccurs="0"/>
-                <xsd:element ref="ns2:LocOverallPublishStatusLookup" minOccurs="0"/>
-                <xsd:element ref="ns2:IntlLocPriority" minOccurs="0"/>
-                <xsd:element ref="ns2:LocProcessedForHandoffsLookup" minOccurs="0"/>
-                <xsd:element ref="ns2:LocProcessedForMarketsLookup" minOccurs="0"/>
-                <xsd:element ref="ns2:LocPublishedDependentAssetsLookup" minOccurs="0"/>
-                <xsd:element ref="ns2:LocPublishedLinkedAssetsLookup" minOccurs="0"/>
-                <xsd:element ref="ns2:LocRecommendedHandoff" minOccurs="0"/>
-                <xsd:element ref="ns2:LocalizationTagsTaxHTField0" minOccurs="0"/>
-                <xsd:element ref="ns2:MachineTranslated" minOccurs="0"/>
-                <xsd:element ref="ns2:Manager" minOccurs="0"/>
-                <xsd:element ref="ns2:Markets" minOccurs="0"/>
-                <xsd:element ref="ns2:Milestone" minOccurs="0"/>
-                <xsd:element ref="ns2:TPNamespace" minOccurs="0"/>
-                <xsd:element ref="ns2:NumericId" minOccurs="0"/>
-                <xsd:element ref="ns2:NumOfRatingsLookup" minOccurs="0"/>
-                <xsd:element ref="ns2:OOCacheId" minOccurs="0"/>
-                <xsd:element ref="ns2:OpenTemplate" minOccurs="0"/>
-                <xsd:element ref="ns2:OriginAsset" minOccurs="0"/>
-                <xsd:element ref="ns2:OriginalRelease" minOccurs="0"/>
-                <xsd:element ref="ns2:OriginalSourceMarket" minOccurs="0"/>
-                <xsd:element ref="ns2:OutputCachingOn" minOccurs="0"/>
-                <xsd:element ref="ns2:ParentAssetId" minOccurs="0"/>
-                <xsd:element ref="ns2:PlannedPubDate" minOccurs="0"/>
-                <xsd:element ref="ns2:PolicheckWords" minOccurs="0"/>
-                <xsd:element ref="ns2:BusinessGroup" minOccurs="0"/>
-                <xsd:element ref="ns2:UAProjectedTotalWords" minOccurs="0"/>
-                <xsd:element ref="ns2:Provider" minOccurs="0"/>
-                <xsd:element ref="ns2:Providers" minOccurs="0"/>
-                <xsd:element ref="ns2:PublishStatusLookup" minOccurs="0"/>
-                <xsd:element ref="ns2:PublishTargets" minOccurs="0"/>
-                <xsd:element ref="ns2:RecommendationsModifier" minOccurs="0"/>
-                <xsd:element ref="ns2:ArtSampleDocs" minOccurs="0"/>
-                <xsd:element ref="ns2:ScenarioTagsTaxHTField0" minOccurs="0"/>
-                <xsd:element ref="ns2:ShowIn" minOccurs="0"/>
-                <xsd:element ref="ns2:SourceTitle" minOccurs="0"/>
-                <xsd:element ref="ns2:CSXSubmissionDate" minOccurs="0"/>
-                <xsd:element ref="ns2:SubmitterId" minOccurs="0"/>
-                <xsd:element ref="ns2:TaxCatchAll" minOccurs="0"/>
-                <xsd:element ref="ns2:TaxCatchAllLabel" minOccurs="0"/>
-                <xsd:element ref="ns2:TemplateStatus" minOccurs="0"/>
-                <xsd:element ref="ns2:TemplateTemplateType" minOccurs="0"/>
-                <xsd:element ref="ns2:ThumbnailAssetId" minOccurs="0"/>
-                <xsd:element ref="ns2:TimesCloned" minOccurs="0"/>
-                <xsd:element ref="ns2:TrustLevel" minOccurs="0"/>
-                <xsd:element ref="ns2:UALocComments" minOccurs="0"/>
-                <xsd:element ref="ns2:UALocRecommendation" minOccurs="0"/>
-                <xsd:element ref="ns2:UANotes" minOccurs="0"/>
-                <xsd:element ref="ns2:TPAppVersion" minOccurs="0"/>
-                <xsd:element ref="ns2:VoteCount" minOccurs="0"/>
-              </xsd:all>
-            </xsd:complexType>
-          </xsd:element>
-        </xsd:sequence>
-      </xsd:complexType>
-    </xsd:element>
-  </xsd:schema>
-  <xsd:schema xmlns:xsd="http://www.w3.org/2001/XMLSchema" xmlns:xs="http://www.w3.org/2001/XMLSchema" xmlns:dms="http://schemas.microsoft.com/office/2006/documentManagement/types" xmlns:pc="http://schemas.microsoft.com/office/infopath/2007/PartnerControls" targetNamespace="4873beb7-5857-4685-be1f-d57550cc96cc" elementFormDefault="qualified">
-    <xsd:import namespace="http://schemas.microsoft.com/office/2006/documentManagement/types"/>
-    <xsd:import namespace="http://schemas.microsoft.com/office/infopath/2007/PartnerControls"/>
-    <xsd:element name="AcquiredFrom" ma:index="1" nillable="true" ma:displayName="Acquired From" ma:default="Internal MS" ma:internalName="AcquiredFrom" ma:readOnly="false">
-      <xsd:simpleType>
-        <xsd:restriction base="dms:Choice">
-          <xsd:enumeration value="Internal MS"/>
-          <xsd:enumeration value="Community"/>
-          <xsd:enumeration value="MVP"/>
-          <xsd:enumeration value="Publisher"/>
-          <xsd:enumeration value="Partner"/>
-          <xsd:enumeration value="None"/>
-        </xsd:restriction>
-      </xsd:simpleType>
-    </xsd:element>
-    <xsd:element name="UACurrentWords" ma:index="2" nillable="true" ma:displayName="Actual Word Count" ma:default="" ma:internalName="UACurrentWords" ma:readOnly="false">
-      <xsd:simpleType>
-        <xsd:restriction base="dms:Unknown"/>
-      </xsd:simpleType>
-    </xsd:element>
-    <xsd:element name="TPApplication" ma:index="3" nillable="true" ma:displayName="Application to Open Template With" ma:default="" ma:internalName="TPApplication">
-      <xsd:simpleType>
-        <xsd:restriction base="dms:Text"/>
-      </xsd:simpleType>
-    </xsd:element>
-    <xsd:element name="ApprovalLog" ma:index="4" nillable="true" ma:displayName="Approval Log" ma:default="" ma:hidden="true" ma:internalName="ApprovalLog" ma:readOnly="false">
-      <xsd:simpleType>
-        <xsd:restriction base="dms:Note"/>
-      </xsd:simpleType>
-    </xsd:element>
-    <xsd:element name="ApprovalStatus" ma:index="5" nillable="true" ma:displayName="Approval Status" ma:default="InProgress" ma:internalName="ApprovalStatus" ma:readOnly="false">
-      <xsd:simpleType>
-        <xsd:restriction base="dms:Choice">
-          <xsd:enumeration value="InProgress"/>
-          <xsd:enumeration value="Rejected"/>
-          <xsd:enumeration value="Questionable"/>
-          <xsd:enumeration value="ApprovedAutomatic"/>
-          <xsd:enumeration value="ApprovedManual"/>
-          <xsd:enumeration value="On Hold"/>
-          <xsd:enumeration value="Needs Review"/>
-          <xsd:enumeration value="A Violation"/>
-          <xsd:enumeration value="Unpublished Violation"/>
-        </xsd:restriction>
-      </xsd:simpleType>
-    </xsd:element>
-    <xsd:element name="AssetStart" ma:index="6" nillable="true" ma:displayName="Asset Begin Date" ma:default="[Today]" ma:internalName="AssetStart" ma:readOnly="false">
-      <xsd:simpleType>
-        <xsd:restriction base="dms:DateTime"/>
-      </xsd:simpleType>
-    </xsd:element>
-    <xsd:element name="AssetExpire" ma:index="7" nillable="true" ma:displayName="Asset End Date" ma:default="2029-01-01T08:00:00Z" ma:format="DateTime" ma:internalName="AssetExpire" ma:readOnly="false">
-      <xsd:simpleType>
-        <xsd:restriction base="dms:DateTime"/>
-      </xsd:simpleType>
-    </xsd:element>
-    <xsd:element name="AssetId" ma:index="8" nillable="true" ma:displayName="Asset ID" ma:default="" ma:indexed="true" ma:internalName="AssetId" ma:readOnly="false">
-      <xsd:simpleType>
-        <xsd:restriction base="dms:Text">
-          <xsd:maxLength value="255"/>
-        </xsd:restriction>
-      </xsd:simpleType>
-    </xsd:element>
-    <xsd:element name="IsSearchable" ma:index="9" nillable="true" ma:displayName="Asset Searchable?" ma:default="true" ma:internalName="IsSearchable" ma:readOnly="false">
-      <xsd:simpleType>
-        <xsd:restriction base="dms:Boolean"/>
-      </xsd:simpleType>
-    </xsd:element>
-    <xsd:element name="AssetType" ma:index="10" nillable="true" ma:displayName="Asset Type" ma:default="" ma:internalName="AssetType" ma:readOnly="false">
-      <xsd:simpleType>
-        <xsd:restriction base="dms:Unknown"/>
-      </xsd:simpleType>
-    </xsd:element>
-    <xsd:element name="APAuthor" ma:index="11" nillable="true" ma:displayName="Author" ma:default="" ma:list="UserInfo" ma:internalName="APAuthor" ma:readOnly="false">
-      <xsd:complexType>
-        <xsd:complexContent>
-          <xsd:extension base="dms:User">
-            <xsd:sequence>
-              <xsd:element name="UserInfo" minOccurs="0" maxOccurs="unbounded">
-                <xsd:complexType>
-                  <xsd:sequence>
-                    <xsd:element name="DisplayName" type="xsd:string" minOccurs="0"/>
-                    <xsd:element name="AccountId" type="dms:UserId" minOccurs="0" nillable="true"/>
-                    <xsd:element name="AccountType" type="xsd:string" minOccurs="0"/>
-                  </xsd:sequence>
-                </xsd:complexType>
-              </xsd:element>
-            </xsd:sequence>
-          </xsd:extension>
-        </xsd:complexContent>
-      </xsd:complexType>
-    </xsd:element>
-    <xsd:element name="AverageRating" ma:index="12" nillable="true" ma:displayName="Average Rating" ma:internalName="AverageRating" ma:readOnly="false">
-      <xsd:simpleType>
-        <xsd:restriction base="dms:Text"/>
-      </xsd:simpleType>
-    </xsd:element>
-    <xsd:element name="BlockPublish" ma:index="13" nillable="true" ma:displayName="Block from Publishing?" ma:default="" ma:internalName="BlockPublish" ma:readOnly="false">
-      <xsd:simpleType>
-        <xsd:restriction base="dms:Boolean"/>
-      </xsd:simpleType>
-    </xsd:element>
-    <xsd:element name="BugNumber" ma:index="14" nillable="true" ma:displayName="Bug Number" ma:default="" ma:internalName="BugNumber" ma:readOnly="false">
-      <xsd:simpleType>
-        <xsd:restriction base="dms:Text"/>
-      </xsd:simpleType>
-    </xsd:element>
-    <xsd:element name="CampaignTagsTaxHTField0" ma:index="16" nillable="true" ma:taxonomy="true" ma:internalName="CampaignTagsTaxHTField0" ma:taxonomyFieldName="CampaignTags" ma:displayName="Campaigns" ma:readOnly="false" ma:default="" ma:fieldId="{1df42cc3-2301-4f11-a52a-6ead923c29ed}" ma:taxonomyMulti="true" ma:sspId="8f79753a-75d3-41f5-8ca3-40b843941b4f" ma:termSetId="ca0e50d4-faa1-44ce-961e-bb1441c60e66" ma:anchorId="00000000-0000-0000-0000-000000000000" ma:open="false" ma:isKeyword="false">
-      <xsd:complexType>
-        <xsd:sequence>
-          <xsd:element ref="pc:Terms" minOccurs="0" maxOccurs="1"/>
-        </xsd:sequence>
-      </xsd:complexType>
-    </xsd:element>
-    <xsd:element name="TPClientViewer" ma:index="17" nillable="true" ma:displayName="Client Viewer" ma:default="" ma:internalName="TPClientViewer">
-      <xsd:simpleType>
-        <xsd:restriction base="dms:Text"/>
-      </xsd:simpleType>
-    </xsd:element>
-    <xsd:element name="ClipArtFilename" ma:index="18" nillable="true" ma:displayName="Clip Art Name" ma:default="" ma:internalName="ClipArtFilename" ma:readOnly="false">
-      <xsd:simpleType>
-        <xsd:restriction base="dms:Text"/>
-      </xsd:simpleType>
-    </xsd:element>
-    <xsd:element name="TPCommandLine" ma:index="19" nillable="true" ma:displayName="Command Line" ma:default="" ma:internalName="TPCommandLine">
-      <xsd:simpleType>
-        <xsd:restriction base="dms:Text"/>
-      </xsd:simpleType>
-    </xsd:element>
-    <xsd:element name="TPComponent" ma:index="20" nillable="true" ma:displayName="Component" ma:default="" ma:internalName="TPComponent">
-      <xsd:simpleType>
-        <xsd:restriction base="dms:Text"/>
-      </xsd:simpleType>
-    </xsd:element>
-    <xsd:element name="ContentItem" ma:index="21" nillable="true" ma:displayName="Content Item" ma:default="" ma:hidden="true" ma:internalName="ContentItem" ma:readOnly="false">
-      <xsd:simpleType>
-        <xsd:restriction base="dms:Unknown"/>
-      </xsd:simpleType>
-    </xsd:element>
-    <xsd:element name="CrawlForDependencies" ma:index="23" nillable="true" ma:displayName="Crawl for Dependencies?" ma:default="true" ma:internalName="CrawlForDependencies" ma:readOnly="false">
-      <xsd:simpleType>
-        <xsd:restriction base="dms:Boolean"/>
-      </xsd:simpleType>
-    </xsd:element>
-    <xsd:element name="CSXHash" ma:index="26" nillable="true" ma:displayName="CSX Hash" ma:default="" ma:indexed="true" ma:internalName="CSXHash" ma:readOnly="false">
-      <xsd:simpleType>
-        <xsd:restriction base="dms:Text"/>
-      </xsd:simpleType>
-    </xsd:element>
-    <xsd:element name="CSXSubmissionMarket" ma:index="27" nillable="true" ma:displayName="CSX Submission Market" ma:default="" ma:list="{2FBD1B11-2ACE-4FDC-B5A3-635D4ADF6F1B}" ma:internalName="CSXSubmissionMarket" ma:readOnly="false" ma:showField="MarketName" ma:web="4873beb7-5857-4685-be1f-d57550cc96cc">
-      <xsd:simpleType>
-        <xsd:restriction base="dms:Lookup"/>
-      </xsd:simpleType>
-    </xsd:element>
-    <xsd:element name="CSXUpdate" ma:index="28" nillable="true" ma:displayName="CSX Updated?" ma:default="false" ma:internalName="CSXUpdate" ma:readOnly="false">
-      <xsd:simpleType>
-        <xsd:restriction base="dms:Boolean"/>
-      </xsd:simpleType>
-    </xsd:element>
-    <xsd:element name="IntlLangReviewDate" ma:index="29" nillable="true" ma:displayName="Date to Complete Intl QA" ma:default="" ma:internalName="IntlLangReviewDate" ma:readOnly="false">
-      <xsd:simpleType>
-        <xsd:restriction base="dms:DateTime"/>
-      </xsd:simpleType>
-    </xsd:element>
-    <xsd:element name="IsDeleted" ma:index="30" nillable="true" ma:displayName="Deleted?" ma:default="" ma:internalName="IsDeleted" ma:readOnly="false">
-      <xsd:simpleType>
-        <xsd:restriction base="dms:Boolean"/>
-      </xsd:simpleType>
-    </xsd:element>
-    <xsd:element name="APDescription" ma:index="31" nillable="true" ma:displayName="Description" ma:default="" ma:internalName="APDescription" ma:readOnly="false">
-      <xsd:simpleType>
-        <xsd:restriction base="dms:Note"/>
-      </xsd:simpleType>
-    </xsd:element>
-    <xsd:element name="DirectSourceMarket" ma:index="32" nillable="true" ma:displayName="Direct Source Market Group" ma:default="" ma:internalName="DirectSourceMarket" ma:readOnly="false">
-      <xsd:simpleType>
-        <xsd:restriction base="dms:Text"/>
-      </xsd:simpleType>
-    </xsd:element>
-    <xsd:element name="Downloads" ma:index="33" nillable="true" ma:displayName="Downloads" ma:default="0" ma:hidden="true" ma:internalName="Downloads" ma:readOnly="false">
-      <xsd:simpleType>
-        <xsd:restriction base="dms:Unknown"/>
-      </xsd:simpleType>
-    </xsd:element>
-    <xsd:element name="DSATActionTaken" ma:index="34" nillable="true" ma:displayName="DSAT Action Taken" ma:default="" ma:internalName="DSATActionTaken" ma:readOnly="false">
-      <xsd:simpleType>
-        <xsd:restriction base="dms:Choice">
-          <xsd:enumeration value="Best Bets"/>
-          <xsd:enumeration value="Expire"/>
-          <xsd:enumeration value="Hide"/>
-          <xsd:enumeration value="None"/>
-        </xsd:restriction>
-      </xsd:simpleType>
-    </xsd:element>
-    <xsd:element name="APEditor" ma:index="35" nillable="true" ma:displayName="Editor" ma:default="" ma:list="UserInfo" ma:internalName="APEditor" ma:readOnly="false">
-      <xsd:complexType>
-        <xsd:complexContent>
-          <xsd:extension base="dms:User">
-            <xsd:sequence>
-              <xsd:element name="UserInfo" minOccurs="0" maxOccurs="unbounded">
-                <xsd:complexType>
-                  <xsd:sequence>
-                    <xsd:element name="DisplayName" type="xsd:string" minOccurs="0"/>
-                    <xsd:element name="AccountId" type="dms:UserId" minOccurs="0" nillable="true"/>
-                    <xsd:element name="AccountType" type="xsd:string" minOccurs="0"/>
-                  </xsd:sequence>
-                </xsd:complexType>
-              </xsd:element>
-            </xsd:sequence>
-          </xsd:extension>
-        </xsd:complexContent>
-      </xsd:complexType>
-    </xsd:element>
-    <xsd:element name="EditorialStatus" ma:index="36" nillable="true" ma:displayName="Editorial Status" ma:default="" ma:internalName="EditorialStatus" ma:readOnly="false">
-      <xsd:simpleType>
-        <xsd:restriction base="dms:Unknown"/>
-      </xsd:simpleType>
-    </xsd:element>
-    <xsd:element name="EditorialTags" ma:index="37" nillable="true" ma:displayName="Editorial Tags" ma:default="" ma:internalName="EditorialTags">
-      <xsd:simpleType>
-        <xsd:restriction base="dms:Unknown"/>
-      </xsd:simpleType>
-    </xsd:element>
-    <xsd:element name="TPExecutable" ma:index="38" nillable="true" ma:displayName="Executable" ma:default="" ma:internalName="TPExecutable">
-      <xsd:simpleType>
-        <xsd:restriction base="dms:Text"/>
-      </xsd:simpleType>
-    </xsd:element>
-    <xsd:element name="FeatureTagsTaxHTField0" ma:index="40" nillable="true" ma:taxonomy="true" ma:internalName="FeatureTagsTaxHTField0" ma:taxonomyFieldName="FeatureTags" ma:displayName="Features" ma:readOnly="false" ma:default="" ma:fieldId="{7fc0d542-15c6-4882-a8e3-13bca44403fb}" ma:taxonomyMulti="true" ma:sspId="8f79753a-75d3-41f5-8ca3-40b843941b4f" ma:termSetId="f1ab6845-967d-4854-a0ba-4ec07f0f8113" ma:anchorId="00000000-0000-0000-0000-000000000000" ma:open="false" ma:isKeyword="false">
-      <xsd:complexType>
-        <xsd:sequence>
-          <xsd:element ref="pc:Terms" minOccurs="0" maxOccurs="1"/>
-        </xsd:sequence>
-      </xsd:complexType>
-    </xsd:element>
-    <xsd:element name="TPFriendlyName" ma:index="41" nillable="true" ma:displayName="Friendly Name" ma:default="" ma:internalName="TPFriendlyName">
-      <xsd:simpleType>
-        <xsd:restriction base="dms:Text"/>
-      </xsd:simpleType>
-    </xsd:element>
-    <xsd:element name="FriendlyTitle" ma:index="42" nillable="true" ma:displayName="Friendly Title" ma:default="" ma:description="Shorter title to be used when displaying search results" ma:internalName="FriendlyTitle" ma:readOnly="false">
-      <xsd:simpleType>
-        <xsd:restriction base="dms:Text"/>
-      </xsd:simpleType>
-    </xsd:element>
-    <xsd:element name="PrimaryImageGen" ma:index="43" nillable="true" ma:displayName="Generate Images?" ma:default="true" ma:internalName="PrimaryImageGen">
-      <xsd:simpleType>
-        <xsd:restriction base="dms:Boolean"/>
-      </xsd:simpleType>
-    </xsd:element>
-    <xsd:element name="HandoffToMSDN" ma:index="44" nillable="true" ma:displayName="Handoff To MSDN Date" ma:default="" ma:internalName="HandoffToMSDN" ma:readOnly="false">
-      <xsd:simpleType>
-        <xsd:restriction base="dms:DateTime"/>
-      </xsd:simpleType>
-    </xsd:element>
-    <xsd:element name="InProjectListLookup" ma:index="45" nillable="true" ma:displayName="InProjectListLookup" ma:list="{9E343742-310B-4684-A24C-1D137CB4B230}" ma:internalName="InProjectListLookup" ma:readOnly="true" ma:showField="InProjectList" ma:web="4873beb7-5857-4685-be1f-d57550cc96cc">
-      <xsd:complexType>
-        <xsd:complexContent>
-          <xsd:extension base="dms:MultiChoiceLookup">
-            <xsd:sequence>
-              <xsd:element name="Value" type="dms:Lookup" maxOccurs="unbounded" minOccurs="0" nillable="true"/>
-            </xsd:sequence>
-          </xsd:extension>
-        </xsd:complexContent>
-      </xsd:complexType>
-    </xsd:element>
-    <xsd:element name="TPInstallLocation" ma:index="46" nillable="true" ma:displayName="Install Location" ma:default="" ma:internalName="TPInstallLocation">
-      <xsd:simpleType>
-        <xsd:restriction base="dms:Text"/>
-      </xsd:simpleType>
-    </xsd:element>
-    <xsd:element name="InternalTagsTaxHTField0" ma:index="48" nillable="true" ma:taxonomy="true" ma:internalName="InternalTagsTaxHTField0" ma:taxonomyFieldName="InternalTags" ma:displayName="Internal Tags" ma:readOnly="false" ma:default="" ma:fieldId="{1490b8a4-2706-41ec-b5e3-73176dccf34e}" ma:taxonomyMulti="true" ma:sspId="8f79753a-75d3-41f5-8ca3-40b843941b4f" ma:termSetId="82b6639e-f7fc-4c18-ad2d-003a6e707765" ma:anchorId="00000000-0000-0000-0000-000000000000" ma:open="false" ma:isKeyword="false">
-      <xsd:complexType>
-        <xsd:sequence>
-          <xsd:element ref="pc:Terms" minOccurs="0" maxOccurs="1"/>
-        </xsd:sequence>
-      </xsd:complexType>
-    </xsd:element>
-    <xsd:element name="IntlLangReview" ma:index="49" nillable="true" ma:displayName="Intl Lang QA Review Required?" ma:default="" ma:internalName="IntlLangReview" ma:readOnly="false">
-      <xsd:simpleType>
-        <xsd:restriction base="dms:Boolean"/>
-      </xsd:simpleType>
-    </xsd:element>
-    <xsd:element name="IntlLangReviewer" ma:index="50" nillable="true" ma:displayName="Intl Lang QA Reviewer" ma:default="" ma:internalName="IntlLangReviewer" ma:readOnly="false">
-      <xsd:simpleType>
-        <xsd:restriction base="dms:Text"/>
-      </xsd:simpleType>
-    </xsd:element>
-    <xsd:element name="MarketSpecific" ma:index="51" nillable="true" ma:displayName="Is Market Specific?" ma:default="" ma:internalName="MarketSpecific" ma:readOnly="false">
-      <xsd:simpleType>
-        <xsd:restriction base="dms:Boolean"/>
-      </xsd:simpleType>
-    </xsd:element>
-    <xsd:element name="LastCompleteVersionLookup" ma:index="52" nillable="true" ma:displayName="Last Complete Version Lookup" ma:default="" ma:list="{9E343742-310B-4684-A24C-1D137CB4B230}" ma:internalName="LastCompleteVersionLookup" ma:readOnly="true" ma:showField="LastCompleteVersion" ma:web="4873beb7-5857-4685-be1f-d57550cc96cc">
-      <xsd:complexType>
-        <xsd:complexContent>
-          <xsd:extension base="dms:MultiChoiceLookup">
-            <xsd:sequence>
-              <xsd:element name="Value" type="dms:Lookup" maxOccurs="unbounded" minOccurs="0" nillable="true"/>
-            </xsd:sequence>
-          </xsd:extension>
-        </xsd:complexContent>
-      </xsd:complexType>
-    </xsd:element>
-    <xsd:element name="LastHandOff" ma:index="53" nillable="true" ma:displayName="Last Hand-off" ma:default="" ma:internalName="LastHandOff" ma:readOnly="false">
-      <xsd:simpleType>
-        <xsd:restriction base="dms:DateTime"/>
-      </xsd:simpleType>
-    </xsd:element>
-    <xsd:element name="LastModifiedDateTime" ma:index="54" nillable="true" ma:displayName="Last Modified Date" ma:default="" ma:internalName="LastModifiedDateTime" ma:readOnly="false">
-      <xsd:simpleType>
-        <xsd:restriction base="dms:DateTime"/>
-      </xsd:simpleType>
-    </xsd:element>
-    <xsd:element name="LastPreviewErrorLookup" ma:index="55" nillable="true" ma:displayName="Last Preview Attempt Error" ma:default="" ma:list="{9E343742-310B-4684-A24C-1D137CB4B230}" ma:internalName="LastPreviewErrorLookup" ma:readOnly="true" ma:showField="LastPreviewError" ma:web="4873beb7-5857-4685-be1f-d57550cc96cc">
-      <xsd:complexType>
-        <xsd:complexContent>
-          <xsd:extension base="dms:MultiChoiceLookup">
-            <xsd:sequence>
-              <xsd:element name="Value" type="dms:Lookup" maxOccurs="unbounded" minOccurs="0" nillable="true"/>
-            </xsd:sequence>
-          </xsd:extension>
-        </xsd:complexContent>
-      </xsd:complexType>
-    </xsd:element>
-    <xsd:element name="LastPreviewResultLookup" ma:index="56" nillable="true" ma:displayName="Last Preview Attempt Result" ma:default="" ma:list="{9E343742-310B-4684-A24C-1D137CB4B230}" ma:internalName="LastPreviewResultLookup" ma:readOnly="true" ma:showField="LastPreviewResult" ma:web="4873beb7-5857-4685-be1f-d57550cc96cc">
-      <xsd:complexType>
-        <xsd:complexContent>
-          <xsd:extension base="dms:MultiChoiceLookup">
-            <xsd:sequence>
-              <xsd:element name="Value" type="dms:Lookup" maxOccurs="unbounded" minOccurs="0" nillable="true"/>
-            </xsd:sequence>
-          </xsd:extension>
-        </xsd:complexContent>
-      </xsd:complexType>
-    </xsd:element>
-    <xsd:element name="LastPreviewAttemptDateLookup" ma:index="57" nillable="true" ma:displayName="Last Preview Attempted On" ma:default="" ma:list="{9E343742-310B-4684-A24C-1D137CB4B230}" ma:internalName="LastPreviewAttemptDateLookup" ma:readOnly="true" ma:showField="LastPreviewAttemptDate" ma:web="4873beb7-5857-4685-be1f-d57550cc96cc">
-      <xsd:complexType>
-        <xsd:complexContent>
-          <xsd:extension base="dms:MultiChoiceLookup">
-            <xsd:sequence>
-              <xsd:element name="Value" type="dms:Lookup" maxOccurs="unbounded" minOccurs="0" nillable="true"/>
-            </xsd:sequence>
-          </xsd:extension>
-        </xsd:complexContent>
-      </xsd:complexType>
-    </xsd:element>
-    <xsd:element name="LastPreviewedByLookup" ma:index="58" nillable="true" ma:displayName="Last Previewed By" ma:default="" ma:list="{9E343742-310B-4684-A24C-1D137CB4B230}" ma:internalName="LastPreviewedByLookup" ma:readOnly="true" ma:showField="LastPreviewedBy" ma:web="4873beb7-5857-4685-be1f-d57550cc96cc">
-      <xsd:complexType>
-        <xsd:complexContent>
-          <xsd:extension base="dms:MultiChoiceLookup">
-            <xsd:sequence>
-              <xsd:element name="Value" type="dms:Lookup" maxOccurs="unbounded" minOccurs="0" nillable="true"/>
-            </xsd:sequence>
-          </xsd:extension>
-        </xsd:complexContent>
-      </xsd:complexType>
-    </xsd:element>
-    <xsd:element name="LastPreviewTimeLookup" ma:index="59" nillable="true" ma:displayName="Last Previewed Date" ma:default="" ma:list="{9E343742-310B-4684-A24C-1D137CB4B230}" ma:internalName="LastPreviewTimeLookup" ma:readOnly="true" ma:showField="LastPreviewTime" ma:web="4873beb7-5857-4685-be1f-d57550cc96cc">
-      <xsd:complexType>
-        <xsd:complexContent>
-          <xsd:extension base="dms:MultiChoiceLookup">
-            <xsd:sequence>
-              <xsd:element name="Value" type="dms:Lookup" maxOccurs="unbounded" minOccurs="0" nillable="true"/>
-            </xsd:sequence>
-          </xsd:extension>
-        </xsd:complexContent>
-      </xsd:complexType>
-    </xsd:element>
-    <xsd:element name="LastPreviewVersionLookup" ma:index="60" nillable="true" ma:displayName="Last Previewed Version" ma:default="" ma:list="{9E343742-310B-4684-A24C-1D137CB4B230}" ma:internalName="LastPreviewVersionLookup" ma:readOnly="true" ma:showField="LastPreviewVersion" ma:web="4873beb7-5857-4685-be1f-d57550cc96cc">
-      <xsd:complexType>
-        <xsd:complexContent>
-          <xsd:extension base="dms:MultiChoiceLookup">
-            <xsd:sequence>
-              <xsd:element name="Value" type="dms:Lookup" maxOccurs="unbounded" minOccurs="0" nillable="true"/>
-            </xsd:sequence>
-          </xsd:extension>
-        </xsd:complexContent>
-      </xsd:complexType>
-    </xsd:element>
-    <xsd:element name="LastPublishErrorLookup" ma:index="61" nillable="true" ma:displayName="Last Publish Attempt Error" ma:default="" ma:list="{9E343742-310B-4684-A24C-1D137CB4B230}" ma:internalName="LastPublishErrorLookup" ma:readOnly="true" ma:showField="LastPublishError" ma:web="4873beb7-5857-4685-be1f-d57550cc96cc">
-      <xsd:complexType>
-        <xsd:complexContent>
-          <xsd:extension base="dms:MultiChoiceLookup">
-            <xsd:sequence>
-              <xsd:element name="Value" type="dms:Lookup" maxOccurs="unbounded" minOccurs="0" nillable="true"/>
-            </xsd:sequence>
-          </xsd:extension>
-        </xsd:complexContent>
-      </xsd:complexType>
-    </xsd:element>
-    <xsd:element name="LastPublishResultLookup" ma:index="62" nillable="true" ma:displayName="Last Publish Attempt Result" ma:default="" ma:list="{9E343742-310B-4684-A24C-1D137CB4B230}" ma:internalName="LastPublishResultLookup" ma:readOnly="true" ma:showField="LastPublishResult" ma:web="4873beb7-5857-4685-be1f-d57550cc96cc">
-      <xsd:complexType>
-        <xsd:complexContent>
-          <xsd:extension base="dms:MultiChoiceLookup">
-            <xsd:sequence>
-              <xsd:element name="Value" type="dms:Lookup" maxOccurs="unbounded" minOccurs="0" nillable="true"/>
-            </xsd:sequence>
-          </xsd:extension>
-        </xsd:complexContent>
-      </xsd:complexType>
-    </xsd:element>
-    <xsd:element name="LastPublishAttemptDateLookup" ma:index="63" nillable="true" ma:displayName="Last Publish Attempted On" ma:default="" ma:list="{9E343742-310B-4684-A24C-1D137CB4B230}" ma:internalName="LastPublishAttemptDateLookup" ma:readOnly="true" ma:showField="LastPublishAttemptDate" ma:web="4873beb7-5857-4685-be1f-d57550cc96cc">
-      <xsd:complexType>
-        <xsd:complexContent>
-          <xsd:extension base="dms:MultiChoiceLookup">
-            <xsd:sequence>
-              <xsd:element name="Value" type="dms:Lookup" maxOccurs="unbounded" minOccurs="0" nillable="true"/>
-            </xsd:sequence>
-          </xsd:extension>
-        </xsd:complexContent>
-      </xsd:complexType>
-    </xsd:element>
-    <xsd:element name="LastPublishedByLookup" ma:index="64" nillable="true" ma:displayName="Last Published By" ma:default="" ma:list="{9E343742-310B-4684-A24C-1D137CB4B230}" ma:internalName="LastPublishedByLookup" ma:readOnly="true" ma:showField="LastPublishedBy" ma:web="4873beb7-5857-4685-be1f-d57550cc96cc">
-      <xsd:complexType>
-        <xsd:complexContent>
-          <xsd:extension base="dms:MultiChoiceLookup">
-            <xsd:sequence>
-              <xsd:element name="Value" type="dms:Lookup" maxOccurs="unbounded" minOccurs="0" nillable="true"/>
-            </xsd:sequence>
-          </xsd:extension>
-        </xsd:complexContent>
-      </xsd:complexType>
-    </xsd:element>
-    <xsd:element name="LastPublishTimeLookup" ma:index="65" nillable="true" ma:displayName="Last Published Date" ma:default="" ma:list="{9E343742-310B-4684-A24C-1D137CB4B230}" ma:internalName="LastPublishTimeLookup" ma:readOnly="true" ma:showField="LastPublishTime" ma:web="4873beb7-5857-4685-be1f-d57550cc96cc">
-      <xsd:complexType>
-        <xsd:complexContent>
-          <xsd:extension base="dms:MultiChoiceLookup">
-            <xsd:sequence>
-              <xsd:element name="Value" type="dms:Lookup" maxOccurs="unbounded" minOccurs="0" nillable="true"/>
-            </xsd:sequence>
-          </xsd:extension>
-        </xsd:complexContent>
-      </xsd:complexType>
-    </xsd:element>
-    <xsd:element name="LastPublishVersionLookup" ma:index="66" nillable="true" ma:displayName="Last Published Version" ma:default="" ma:list="{9E343742-310B-4684-A24C-1D137CB4B230}" ma:internalName="LastPublishVersionLookup" ma:readOnly="true" ma:showField="LastPublishVersion" ma:web="4873beb7-5857-4685-be1f-d57550cc96cc">
-      <xsd:complexType>
-        <xsd:complexContent>
-          <xsd:extension base="dms:MultiChoiceLookup">
-            <xsd:sequence>
-              <xsd:element name="Value" type="dms:Lookup" maxOccurs="unbounded" minOccurs="0" nillable="true"/>
-            </xsd:sequence>
-          </xsd:extension>
-        </xsd:complexContent>
-      </xsd:complexType>
-    </xsd:element>
-    <xsd:element name="TPLaunchHelpLinkType" ma:index="67" nillable="true" ma:displayName="Launch Help Link Type" ma:default="Template" ma:internalName="TPLaunchHelpLinkType">
-      <xsd:simpleType>
-        <xsd:restriction base="dms:Choice">
-          <xsd:enumeration value="Template"/>
-          <xsd:enumeration value="Training"/>
-          <xsd:enumeration value="URL"/>
-          <xsd:enumeration value="None"/>
-        </xsd:restriction>
-      </xsd:simpleType>
-    </xsd:element>
-    <xsd:element name="LegacyData" ma:index="68" nillable="true" ma:displayName="Legacy Data" ma:default="" ma:internalName="LegacyData" ma:readOnly="false">
-      <xsd:simpleType>
-        <xsd:restriction base="dms:Note"/>
-      </xsd:simpleType>
-    </xsd:element>
-    <xsd:element name="TPLaunchHelpLink" ma:index="69" nillable="true" ma:displayName="Link to Launch Help Topic" ma:default="" ma:internalName="TPLaunchHelpLink">
-      <xsd:simpleType>
-        <xsd:restriction base="dms:Text"/>
-      </xsd:simpleType>
-    </xsd:element>
-    <xsd:element name="LocComments" ma:index="70" nillable="true" ma:displayName="Loc Approval Comments" ma:default="" ma:internalName="LocComments" ma:readOnly="false">
-      <xsd:simpleType>
-        <xsd:restriction base="dms:Note"/>
-      </xsd:simpleType>
-    </xsd:element>
-    <xsd:element name="LocLastLocAttemptVersionLookup" ma:index="71" nillable="true" ma:displayName="Loc Last Loc Attempt Version" ma:default="" ma:list="{7DD1DCEC-E449-43D3-891F-7DC62F62AD21}" ma:internalName="LocLastLocAttemptVersionLookup" ma:readOnly="false" ma:showField="LastLocAttemptVersion" ma:web="4873beb7-5857-4685-be1f-d57550cc96cc">
-      <xsd:simpleType>
-        <xsd:restriction base="dms:Lookup"/>
-      </xsd:simpleType>
-    </xsd:element>
-    <xsd:element name="LocLastLocAttemptVersionTypeLookup" ma:index="72" nillable="true" ma:displayName="Loc Last Loc Attempt Version Type" ma:default="" ma:list="{7DD1DCEC-E449-43D3-891F-7DC62F62AD21}" ma:internalName="LocLastLocAttemptVersionTypeLookup" ma:readOnly="true" ma:showField="LastLocAttemptVersionType" ma:web="4873beb7-5857-4685-be1f-d57550cc96cc">
-      <xsd:simpleType>
-        <xsd:restriction base="dms:Lookup"/>
-      </xsd:simpleType>
-    </xsd:element>
-    <xsd:element name="LocManualTestRequired" ma:index="73" nillable="true" ma:displayName="Loc Manual Test Required" ma:default="" ma:internalName="LocManualTestRequired" ma:readOnly="false">
-      <xsd:simpleType>
-        <xsd:restriction base="dms:Boolean"/>
-      </xsd:simpleType>
-    </xsd:element>
-    <xsd:element name="LocMarketGroupTiers2" ma:index="74" nillable="true" ma:displayName="Loc Market Group Tiers" ma:internalName="LocMarketGroupTiers2" ma:readOnly="false">
-      <xsd:simpleType>
-        <xsd:restriction base="dms:Unknown"/>
-      </xsd:simpleType>
-    </xsd:element>
-    <xsd:element name="LocNewPublishedVersionLookup" ma:index="75" nillable="true" ma:displayName="Loc New Published Version Lookup" ma:default="" ma:list="{7DD1DCEC-E449-43D3-891F-7DC62F62AD21}" ma:internalName="LocNewPublishedVersionLookup" ma:readOnly="true" ma:showField="NewPublishedVersion" ma:web="4873beb7-5857-4685-be1f-d57550cc96cc">
-      <xsd:simpleType>
-        <xsd:restriction base="dms:Lookup"/>
-      </xsd:simpleType>
-    </xsd:element>
-    <xsd:element name="LocOverallHandbackStatusLookup" ma:index="76" nillable="true" ma:displayName="Loc Overall Handback Status" ma:default="" ma:list="{7DD1DCEC-E449-43D3-891F-7DC62F62AD21}" ma:internalName="LocOverallHandbackStatusLookup" ma:readOnly="true" ma:showField="OverallHandbackStatus" ma:web="4873beb7-5857-4685-be1f-d57550cc96cc">
-      <xsd:simpleType>
-        <xsd:restriction base="dms:Lookup"/>
-      </xsd:simpleType>
-    </xsd:element>
-    <xsd:element name="LocOverallLocStatusLookup" ma:index="77" nillable="true" ma:displayName="Loc Overall Localize Status" ma:default="" ma:list="{7DD1DCEC-E449-43D3-891F-7DC62F62AD21}" ma:internalName="LocOverallLocStatusLookup" ma:readOnly="true" ma:showField="OverallLocStatus" ma:web="4873beb7-5857-4685-be1f-d57550cc96cc">
-      <xsd:simpleType>
-        <xsd:restriction base="dms:Lookup"/>
-      </xsd:simpleType>
-    </xsd:element>
-    <xsd:element name="LocOverallPreviewStatusLookup" ma:index="78" nillable="true" ma:displayName="Loc Overall Preview Status" ma:default="" ma:list="{7DD1DCEC-E449-43D3-891F-7DC62F62AD21}" ma:internalName="LocOverallPreviewStatusLookup" ma:readOnly="true" ma:showField="OverallPreviewStatus" ma:web="4873beb7-5857-4685-be1f-d57550cc96cc">
-      <xsd:simpleType>
-        <xsd:restriction base="dms:Lookup"/>
-      </xsd:simpleType>
-    </xsd:element>
-    <xsd:element name="LocOverallPublishStatusLookup" ma:index="79" nillable="true" ma:displayName="Loc Overall Publish Status" ma:default="" ma:list="{7DD1DCEC-E449-43D3-891F-7DC62F62AD21}" ma:internalName="LocOverallPublishStatusLookup" ma:readOnly="true" ma:showField="OverallPublishStatus" ma:web="4873beb7-5857-4685-be1f-d57550cc96cc">
-      <xsd:simpleType>
-        <xsd:restriction base="dms:Lookup"/>
-      </xsd:simpleType>
-    </xsd:element>
-    <xsd:element name="IntlLocPriority" ma:index="80" nillable="true" ma:displayName="Loc Priority" ma:default="" ma:internalName="IntlLocPriority" ma:readOnly="false">
-      <xsd:simpleType>
-        <xsd:restriction base="dms:Unknown"/>
-      </xsd:simpleType>
-    </xsd:element>
-    <xsd:element name="LocProcessedForHandoffsLookup" ma:index="81" nillable="true" ma:displayName="Loc Processed For Handoffs" ma:default="" ma:list="{7DD1DCEC-E449-43D3-891F-7DC62F62AD21}" ma:internalName="LocProcessedForHandoffsLookup" ma:readOnly="true" ma:showField="ProcessedForHandoffs" ma:web="4873beb7-5857-4685-be1f-d57550cc96cc">
-      <xsd:simpleType>
-        <xsd:restriction base="dms:Lookup"/>
-      </xsd:simpleType>
-    </xsd:element>
-    <xsd:element name="LocProcessedForMarketsLookup" ma:index="82" nillable="true" ma:displayName="Loc Processed For Markets" ma:default="" ma:list="{7DD1DCEC-E449-43D3-891F-7DC62F62AD21}" ma:internalName="LocProcessedForMarketsLookup" ma:readOnly="true" ma:showField="ProcessedForMarkets" ma:web="4873beb7-5857-4685-be1f-d57550cc96cc">
-      <xsd:simpleType>
-        <xsd:restriction base="dms:Lookup"/>
-      </xsd:simpleType>
-    </xsd:element>
-    <xsd:element name="LocPublishedDependentAssetsLookup" ma:index="83" nillable="true" ma:displayName="Loc Published Dependent Assets" ma:default="" ma:list="{7DD1DCEC-E449-43D3-891F-7DC62F62AD21}" ma:internalName="LocPublishedDependentAssetsLookup" ma:readOnly="true" ma:showField="PublishedDependentAssets" ma:web="4873beb7-5857-4685-be1f-d57550cc96cc">
-      <xsd:simpleType>
-        <xsd:restriction base="dms:Lookup"/>
-      </xsd:simpleType>
-    </xsd:element>
-    <xsd:element name="LocPublishedLinkedAssetsLookup" ma:index="84" nillable="true" ma:displayName="Loc Published Linked Assets" ma:default="" ma:list="{7DD1DCEC-E449-43D3-891F-7DC62F62AD21}" ma:internalName="LocPublishedLinkedAssetsLookup" ma:readOnly="true" ma:showField="PublishedLinkedAssets" ma:web="4873beb7-5857-4685-be1f-d57550cc96cc">
-      <xsd:simpleType>
-        <xsd:restriction base="dms:Lookup"/>
-      </xsd:simpleType>
-    </xsd:element>
-    <xsd:element name="LocRecommendedHandoff" ma:index="85" nillable="true" ma:displayName="Loc Recommended Handoff" ma:default="" ma:indexed="true" ma:internalName="LocRecommendedHandoff" ma:readOnly="false">
-      <xsd:simpleType>
-        <xsd:restriction base="dms:Text"/>
-      </xsd:simpleType>
-    </xsd:element>
-    <xsd:element name="LocalizationTagsTaxHTField0" ma:index="87" nillable="true" ma:taxonomy="true" ma:internalName="LocalizationTagsTaxHTField0" ma:taxonomyFieldName="LocalizationTags" ma:displayName="Localization Tags" ma:readOnly="false" ma:default="" ma:fieldId="{00f02cb3-2c7c-424a-9c61-10e9b6878429}" ma:taxonomyMulti="true" ma:sspId="8f79753a-75d3-41f5-8ca3-40b843941b4f" ma:termSetId="5b7703a5-8e8b-4b58-8b31-1cea35331da3" ma:anchorId="00000000-0000-0000-0000-000000000000" ma:open="false" ma:isKeyword="false">
-      <xsd:complexType>
-        <xsd:sequence>
-          <xsd:element ref="pc:Terms" minOccurs="0" maxOccurs="1"/>
-        </xsd:sequence>
-      </xsd:complexType>
-    </xsd:element>
-    <xsd:element name="MachineTranslated" ma:index="88" nillable="true" ma:displayName="Machine Translated" ma:default="" ma:internalName="MachineTranslated" ma:readOnly="false">
-      <xsd:simpleType>
-        <xsd:restriction base="dms:Boolean"/>
-      </xsd:simpleType>
-    </xsd:element>
-    <xsd:element name="Manager" ma:index="89" nillable="true" ma:displayName="Manager" ma:hidden="true" ma:internalName="Manager" ma:readOnly="false">
-      <xsd:simpleType>
-        <xsd:restriction base="dms:Text"/>
-      </xsd:simpleType>
-    </xsd:element>
-    <xsd:element name="Markets" ma:index="90" nillable="true" ma:displayName="Markets" ma:default="" ma:description="Leave blank to show in all markets" ma:list="{2FBD1B11-2ACE-4FDC-B5A3-635D4ADF6F1B}" ma:internalName="Markets" ma:readOnly="false" ma:showField="MarketName" ma:web="4873beb7-5857-4685-be1f-d57550cc96cc">
-      <xsd:complexType>
-        <xsd:complexContent>
-          <xsd:extension base="dms:MultiChoiceLookup">
-            <xsd:sequence>
-              <xsd:element name="Value" type="dms:Lookup" maxOccurs="unbounded" minOccurs="0" nillable="true"/>
-            </xsd:sequence>
-          </xsd:extension>
-        </xsd:complexContent>
-      </xsd:complexType>
-    </xsd:element>
-    <xsd:element name="Milestone" ma:index="91" nillable="true" ma:displayName="Milestone" ma:default="" ma:internalName="Milestone" ma:readOnly="false">
-      <xsd:simpleType>
-        <xsd:restriction base="dms:Unknown"/>
-      </xsd:simpleType>
-    </xsd:element>
-    <xsd:element name="TPNamespace" ma:index="94" nillable="true" ma:displayName="Namespace" ma:default="" ma:internalName="TPNamespace">
-      <xsd:simpleType>
-        <xsd:restriction base="dms:Text"/>
-      </xsd:simpleType>
-    </xsd:element>
-    <xsd:element name="NumericId" ma:index="95" nillable="true" ma:displayName="Numeric ID" ma:default="" ma:indexed="true" ma:internalName="NumericId" ma:readOnly="false">
-      <xsd:simpleType>
-        <xsd:restriction base="dms:Number"/>
-      </xsd:simpleType>
-    </xsd:element>
-    <xsd:element name="NumOfRatingsLookup" ma:index="96" nillable="true" ma:displayName="NumOfRatings" ma:default="" ma:list="{9E343742-310B-4684-A24C-1D137CB4B230}" ma:internalName="NumOfRatingsLookup" ma:readOnly="true" ma:showField="NumOfRatings" ma:web="4873beb7-5857-4685-be1f-d57550cc96cc">
-      <xsd:complexType>
-        <xsd:complexContent>
-          <xsd:extension base="dms:MultiChoiceLookup">
-            <xsd:sequence>
-              <xsd:element name="Value" type="dms:Lookup" maxOccurs="unbounded" minOccurs="0" nillable="true"/>
-            </xsd:sequence>
-          </xsd:extension>
-        </xsd:complexContent>
-      </xsd:complexType>
-    </xsd:element>
-    <xsd:element name="OOCacheId" ma:index="97" nillable="true" ma:displayName="OOCacheId" ma:internalName="OOCacheId" ma:readOnly="false">
-      <xsd:simpleType>
-        <xsd:restriction base="dms:Text"/>
-      </xsd:simpleType>
-    </xsd:element>
-    <xsd:element name="OpenTemplate" ma:index="98" nillable="true" ma:displayName="Open Template" ma:default="true" ma:internalName="OpenTemplate">
-      <xsd:simpleType>
-        <xsd:restriction base="dms:Boolean"/>
-      </xsd:simpleType>
-    </xsd:element>
-    <xsd:element name="OriginAsset" ma:index="99" nillable="true" ma:displayName="Origin Asset" ma:default="" ma:internalName="OriginAsset" ma:readOnly="false">
-      <xsd:simpleType>
-        <xsd:restriction base="dms:Text"/>
-      </xsd:simpleType>
-    </xsd:element>
-    <xsd:element name="OriginalRelease" ma:index="100" nillable="true" ma:displayName="Original Release" ma:default="15" ma:internalName="OriginalRelease" ma:readOnly="false">
-      <xsd:simpleType>
-        <xsd:restriction base="dms:Choice">
-          <xsd:enumeration value="14"/>
-          <xsd:enumeration value="15"/>
-          <xsd:enumeration value="16"/>
-        </xsd:restriction>
-      </xsd:simpleType>
-    </xsd:element>
-    <xsd:element name="OriginalSourceMarket" ma:index="101" nillable="true" ma:displayName="Original Source Market Group" ma:default="" ma:internalName="OriginalSourceMarket" ma:readOnly="false">
-      <xsd:simpleType>
-        <xsd:restriction base="dms:Text"/>
-      </xsd:simpleType>
-    </xsd:element>
-    <xsd:element name="OutputCachingOn" ma:index="102" nillable="true" ma:displayName="Output Caching" ma:default="true" ma:hidden="true" ma:internalName="OutputCachingOn" ma:readOnly="false">
-      <xsd:simpleType>
-        <xsd:restriction base="dms:Boolean"/>
-      </xsd:simpleType>
-    </xsd:element>
-    <xsd:element name="ParentAssetId" ma:index="103" nillable="true" ma:displayName="Parent Asset Id" ma:default="" ma:internalName="ParentAssetId" ma:readOnly="false">
-      <xsd:simpleType>
-        <xsd:restriction base="dms:Text"/>
-      </xsd:simpleType>
-    </xsd:element>
-    <xsd:element name="PlannedPubDate" ma:index="104" nillable="true" ma:displayName="Planned Publish Date" ma:default="" ma:indexed="true" ma:internalName="PlannedPubDate" ma:readOnly="false">
-      <xsd:simpleType>
-        <xsd:restriction base="dms:DateTime"/>
-      </xsd:simpleType>
-    </xsd:element>
-    <xsd:element name="PolicheckWords" ma:index="105" nillable="true" ma:displayName="Policheck Words" ma:default="" ma:internalName="PolicheckWords" ma:readOnly="false">
-      <xsd:simpleType>
-        <xsd:restriction base="dms:Text"/>
-      </xsd:simpleType>
-    </xsd:element>
-    <xsd:element name="BusinessGroup" ma:index="106" nillable="true" ma:displayName="Product Division Owner" ma:default="" ma:internalName="BusinessGroup" ma:readOnly="false">
-      <xsd:simpleType>
-        <xsd:restriction base="dms:Unknown"/>
-      </xsd:simpleType>
-    </xsd:element>
-    <xsd:element name="UAProjectedTotalWords" ma:index="107" nillable="true" ma:displayName="Projected Word Count" ma:default="" ma:internalName="UAProjectedTotalWords" ma:readOnly="false">
-      <xsd:simpleType>
-        <xsd:restriction base="dms:Unknown"/>
-      </xsd:simpleType>
-    </xsd:element>
-    <xsd:element name="Provider" ma:index="108" nillable="true" ma:displayName="Provider" ma:default="" ma:internalName="Provider" ma:readOnly="false">
-      <xsd:simpleType>
-        <xsd:restriction base="dms:Unknown"/>
-      </xsd:simpleType>
-    </xsd:element>
-    <xsd:element name="Providers" ma:index="109" nillable="true" ma:displayName="Providers" ma:default="" ma:internalName="Providers">
-      <xsd:simpleType>
-        <xsd:restriction base="dms:Unknown"/>
-      </xsd:simpleType>
-    </xsd:element>
-    <xsd:element name="PublishStatusLookup" ma:index="110" nillable="true" ma:displayName="Publish Status" ma:default="" ma:list="{9E343742-310B-4684-A24C-1D137CB4B230}" ma:internalName="PublishStatusLookup" ma:readOnly="false" ma:showField="PublishStatus" ma:web="4873beb7-5857-4685-be1f-d57550cc96cc">
-      <xsd:complexType>
-        <xsd:complexContent>
-          <xsd:extension base="dms:MultiChoiceLookup">
-            <xsd:sequence>
-              <xsd:element name="Value" type="dms:Lookup" maxOccurs="unbounded" minOccurs="0" nillable="true"/>
-            </xsd:sequence>
-          </xsd:extension>
-        </xsd:complexContent>
-      </xsd:complexType>
-    </xsd:element>
-    <xsd:element name="PublishTargets" ma:index="111" nillable="true" ma:displayName="Publish Target" ma:default="OfficeOnlineVNext" ma:internalName="PublishTargets" ma:readOnly="false">
-      <xsd:simpleType>
-        <xsd:restriction base="dms:Unknown"/>
-      </xsd:simpleType>
-    </xsd:element>
-    <xsd:element name="RecommendationsModifier" ma:index="112" nillable="true" ma:displayName="Recommendations Modifier" ma:default="" ma:internalName="RecommendationsModifier" ma:readOnly="false">
-      <xsd:simpleType>
-        <xsd:restriction base="dms:Number"/>
-      </xsd:simpleType>
-    </xsd:element>
-    <xsd:element name="ArtSampleDocs" ma:index="113" nillable="true" ma:displayName="Sample Docs" ma:default="" ma:hidden="true" ma:internalName="ArtSampleDocs" ma:readOnly="false">
-      <xsd:simpleType>
-        <xsd:restriction base="dms:Text"/>
-      </xsd:simpleType>
-    </xsd:element>
-    <xsd:element name="ScenarioTagsTaxHTField0" ma:index="115" nillable="true" ma:taxonomy="true" ma:internalName="ScenarioTagsTaxHTField0" ma:taxonomyFieldName="ScenarioTags" ma:displayName="Scenarios" ma:readOnly="false" ma:default="" ma:fieldId="{93aef74d-6c78-4815-8310-51477dceeccc}" ma:taxonomyMulti="true" ma:sspId="8f79753a-75d3-41f5-8ca3-40b843941b4f" ma:termSetId="4b7d5f16-e2f2-4fc0-bab3-6e8b931e57d6" ma:anchorId="00000000-0000-0000-0000-000000000000" ma:open="false" ma:isKeyword="false">
-      <xsd:complexType>
-        <xsd:sequence>
-          <xsd:element ref="pc:Terms" minOccurs="0" maxOccurs="1"/>
-        </xsd:sequence>
-      </xsd:complexType>
-    </xsd:element>
-    <xsd:element name="ShowIn" ma:index="117" nillable="true" ma:displayName="Show In" ma:default="Show everywhere" ma:internalName="ShowIn" ma:readOnly="false">
-      <xsd:simpleType>
-        <xsd:restriction base="dms:Choice">
-          <xsd:enumeration value="Hide on web"/>
-          <xsd:enumeration value="On Web no search"/>
-          <xsd:enumeration value="Show everywhere"/>
-          <xsd:enumeration value="Special use only"/>
-        </xsd:restriction>
-      </xsd:simpleType>
-    </xsd:element>
-    <xsd:element name="SourceTitle" ma:index="118" nillable="true" ma:displayName="Source Title" ma:default="" ma:indexed="true" ma:internalName="SourceTitle" ma:readOnly="false">
-      <xsd:simpleType>
-        <xsd:restriction base="dms:Text"/>
-      </xsd:simpleType>
-    </xsd:element>
-    <xsd:element name="CSXSubmissionDate" ma:index="119" nillable="true" ma:displayName="Submission Date" ma:default="" ma:internalName="CSXSubmissionDate" ma:readOnly="false">
-      <xsd:simpleType>
-        <xsd:restriction base="dms:DateTime"/>
-      </xsd:simpleType>
-    </xsd:element>
-    <xsd:element name="SubmitterId" ma:index="120" nillable="true" ma:displayName="Submitter ID" ma:default="" ma:internalName="SubmitterId" ma:readOnly="false">
-      <xsd:simpleType>
-        <xsd:restriction base="dms:Text"/>
-      </xsd:simpleType>
-    </xsd:element>
-    <xsd:element name="TaxCatchAll" ma:index="121" nillable="true" ma:displayName="Taxonomy Catch All Column" ma:hidden="true" ma:list="{530f955b-6704-4601-bd83-f81d87f1e440}" ma:internalName="TaxCatchAll" ma:showField="CatchAllData" ma:web="4873beb7-5857-4685-be1f-d57550cc96cc">
-      <xsd:complexType>
-        <xsd:complexContent>
-          <xsd:extension base="dms:MultiChoiceLookup">
-            <xsd:sequence>
-              <xsd:element name="Value" type="dms:Lookup" maxOccurs="unbounded" minOccurs="0" nillable="true"/>
-            </xsd:sequence>
-          </xsd:extension>
-        </xsd:complexContent>
-      </xsd:complexType>
-    </xsd:element>
-    <xsd:element name="TaxCatchAllLabel" ma:index="122" nillable="true" ma:displayName="Taxonomy Catch All Column1" ma:hidden="true" ma:list="{530f955b-6704-4601-bd83-f81d87f1e440}" ma:internalName="TaxCatchAllLabel" ma:readOnly="true" ma:showField="CatchAllDataLabel" ma:web="4873beb7-5857-4685-be1f-d57550cc96cc">
-      <xsd:complexType>
-        <xsd:complexContent>
-          <xsd:extension base="dms:MultiChoiceLookup">
-            <xsd:sequence>
-              <xsd:element name="Value" type="dms:Lookup" maxOccurs="unbounded" minOccurs="0" nillable="true"/>
-            </xsd:sequence>
-          </xsd:extension>
-        </xsd:complexContent>
-      </xsd:complexType>
-    </xsd:element>
-    <xsd:element name="TemplateStatus" ma:index="123" nillable="true" ma:displayName="Template Status" ma:default="" ma:internalName="TemplateStatus">
-      <xsd:simpleType>
-        <xsd:restriction base="dms:Unknown"/>
-      </xsd:simpleType>
-    </xsd:element>
-    <xsd:element name="TemplateTemplateType" ma:index="124" nillable="true" ma:displayName="Template Type" ma:default="" ma:internalName="TemplateTemplateType">
-      <xsd:simpleType>
-        <xsd:restriction base="dms:Unknown"/>
-      </xsd:simpleType>
-    </xsd:element>
-    <xsd:element name="ThumbnailAssetId" ma:index="125" nillable="true" ma:displayName="Thumbnail Image Asset" ma:default="" ma:internalName="ThumbnailAssetId" ma:readOnly="false">
-      <xsd:simpleType>
-        <xsd:restriction base="dms:Text"/>
-      </xsd:simpleType>
-    </xsd:element>
-    <xsd:element name="TimesCloned" ma:index="126" nillable="true" ma:displayName="Times Cloned" ma:default="" ma:internalName="TimesCloned" ma:readOnly="false">
-      <xsd:simpleType>
-        <xsd:restriction base="dms:Number"/>
-      </xsd:simpleType>
-    </xsd:element>
-    <xsd:element name="TrustLevel" ma:index="128" nillable="true" ma:displayName="Trust Level" ma:default="1 Microsoft Managed Content" ma:internalName="TrustLevel" ma:readOnly="false">
-      <xsd:simpleType>
-        <xsd:restriction base="dms:Unknown"/>
-      </xsd:simpleType>
-    </xsd:element>
-    <xsd:element name="UALocComments" ma:index="129" nillable="true" ma:displayName="UA Loc Comments" ma:default="" ma:internalName="UALocComments" ma:readOnly="false">
-      <xsd:simpleType>
-        <xsd:restriction base="dms:Note"/>
-      </xsd:simpleType>
-    </xsd:element>
-    <xsd:element name="UALocRecommendation" ma:index="130" nillable="true" ma:displayName="UA Loc Recommendation" ma:default="Localize" ma:internalName="UALocRecommendation" ma:readOnly="false">
-      <xsd:simpleType>
-        <xsd:restriction base="dms:Choice">
-          <xsd:enumeration value="Localize"/>
-          <xsd:enumeration value="Never Localize"/>
-          <xsd:enumeration value="Priority Localize"/>
-        </xsd:restriction>
-      </xsd:simpleType>
-    </xsd:element>
-    <xsd:element name="UANotes" ma:index="131" nillable="true" ma:displayName="UA Notes" ma:default="" ma:internalName="UANotes" ma:readOnly="false">
-      <xsd:simpleType>
-        <xsd:restriction base="dms:Note"/>
-      </xsd:simpleType>
-    </xsd:element>
-    <xsd:element name="TPAppVersion" ma:index="132" nillable="true" ma:displayName="Version" ma:default="" ma:internalName="TPAppVersion">
-      <xsd:simpleType>
-        <xsd:restriction base="dms:Text"/>
-      </xsd:simpleType>
-    </xsd:element>
-    <xsd:element name="VoteCount" ma:index="133" nillable="true" ma:displayName="Vote Count" ma:default="" ma:internalName="VoteCount" ma:readOnly="false">
-      <xsd:simpleType>
-        <xsd:restriction base="dms:Unknown"/>
-      </xsd:simpleType>
-    </xsd:element>
-  </xsd:schema>
-  <xsd:schema xmlns="http://schemas.openxmlformats.org/package/2006/metadata/core-properties" xmlns:xsd="http://www.w3.org/2001/XMLSchema" xmlns:xsi="http://www.w3.org/2001/XMLSchema-instance" xmlns:dc="http://purl.org/dc/elements/1.1/" xmlns:dcterms="http://purl.org/dc/terms/" xmlns:odoc="http://schemas.microsoft.com/internal/obd" targetNamespace="http://schemas.openxmlformats.org/package/2006/metadata/core-properties" elementFormDefault="qualified" attributeFormDefault="unqualified" blockDefault="#all">
-    <xsd:import namespace="http://purl.org/dc/elements/1.1/" schemaLocation="http://dublincore.org/schemas/xmls/qdc/2003/04/02/dc.xsd"/>
-    <xsd:import namespace="http://purl.org/dc/terms/" schemaLocation="http://dublincore.org/schemas/xmls/qdc/2003/04/02/dcterms.xsd"/>
-    <xsd:element name="coreProperties" type="CT_coreProperties"/>
-    <xsd:complexType name="CT_coreProperties">
-      <xsd:all>
-        <xsd:element ref="dc:creator" minOccurs="0" maxOccurs="1"/>
-        <xsd:element ref="dcterms:created" minOccurs="0" maxOccurs="1"/>
-        <xsd:element ref="dc:identifier" minOccurs="0" maxOccurs="1"/>
-        <xsd:element name="contentType" minOccurs="0" maxOccurs="1" type="xsd:string" ma:index="22" ma:displayName="Content Type"/>
-        <xsd:element ref="dc:title" minOccurs="0" maxOccurs="1" ma:index="127" ma:displayName="Title"/>
-        <xsd:element ref="dc:subject" minOccurs="0" maxOccurs="1"/>
-        <xsd:element ref="dc:description" minOccurs="0" maxOccurs="1"/>
-        <xsd:element name="keywords" minOccurs="0" maxOccurs="1" type="xsd:string"/>
-        <xsd:element ref="dc:language" minOccurs="0" maxOccurs="1"/>
-        <xsd:element name="category" minOccurs="0" maxOccurs="1" type="xsd:string"/>
-        <xsd:element name="version" minOccurs="0" maxOccurs="1" type="xsd:string"/>
-        <xsd:element name="revision" minOccurs="0" maxOccurs="1" type="xsd:string">
-          <xsd:annotation>
-            <xsd:documentation>
-                        This value indicates the number of saves or revisions. The application is responsible for updating this value after each revision.
-                    </xsd:documentation>
-          </xsd:annotation>
-        </xsd:element>
-        <xsd:element name="lastModifiedBy" minOccurs="0" maxOccurs="1" type="xsd:string"/>
-        <xsd:element ref="dcterms:modified" minOccurs="0" maxOccurs="1"/>
-        <xsd:element name="contentStatus" minOccurs="0" maxOccurs="1" type="xsd:string"/>
-      </xsd:all>
-    </xsd:complexType>
-  </xsd:schema>
-  <xs:schema xmlns:pc="http://schemas.microsoft.com/office/infopath/2007/PartnerControls" xmlns:xs="http://www.w3.org/2001/XMLSchema" targetNamespace="http://schemas.microsoft.com/office/infopath/2007/PartnerControls" elementFormDefault="qualified" attributeFormDefault="unqualified">
-    <xs:element name="Person">
-      <xs:complexType>
-        <xs:sequence>
-          <xs:element ref="pc:DisplayName" minOccurs="0"/>
-          <xs:element ref="pc:AccountId" minOccurs="0"/>
-          <xs:element ref="pc:AccountType" minOccurs="0"/>
-        </xs:sequence>
-      </xs:complexType>
-    </xs:element>
-    <xs:element name="DisplayName" type="xs:string"/>
-    <xs:element name="AccountId" type="xs:string"/>
-    <xs:element name="AccountType" type="xs:string"/>
-    <xs:element name="BDCAssociatedEntity">
-      <xs:complexType>
-        <xs:sequence>
-          <xs:element ref="pc:BDCEntity" minOccurs="0" maxOccurs="unbounded"/>
-        </xs:sequence>
-        <xs:attribute ref="pc:EntityNamespace"/>
-        <xs:attribute ref="pc:EntityName"/>
-        <xs:attribute ref="pc:SystemInstanceName"/>
-        <xs:attribute ref="pc:AssociationName"/>
-      </xs:complexType>
-    </xs:element>
-    <xs:attribute name="EntityNamespace" type="xs:string"/>
-    <xs:attribute name="EntityName" type="xs:string"/>
-    <xs:attribute name="SystemInstanceName" type="xs:string"/>
-    <xs:attribute name="AssociationName" type="xs:string"/>
-    <xs:element name="BDCEntity">
-      <xs:complexType>
-        <xs:sequence>
-          <xs:element ref="pc:EntityDisplayName" minOccurs="0"/>
-          <xs:element ref="pc:EntityInstanceReference" minOccurs="0"/>
-          <xs:element ref="pc:EntityId1" minOccurs="0"/>
-          <xs:element ref="pc:EntityId2" minOccurs="0"/>
-          <xs:element ref="pc:EntityId3" minOccurs="0"/>
-          <xs:element ref="pc:EntityId4" minOccurs="0"/>
-          <xs:element ref="pc:EntityId5" minOccurs="0"/>
-        </xs:sequence>
-      </xs:complexType>
-    </xs:element>
-    <xs:element name="EntityDisplayName" type="xs:string"/>
-    <xs:element name="EntityInstanceReference" type="xs:string"/>
-    <xs:element name="EntityId1" type="xs:string"/>
-    <xs:element name="EntityId2" type="xs:string"/>
-    <xs:element name="EntityId3" type="xs:string"/>
-    <xs:element name="EntityId4" type="xs:string"/>
-    <xs:element name="EntityId5" type="xs:string"/>
-    <xs:element name="Terms">
-      <xs:complexType>
-        <xs:sequence>
-          <xs:element ref="pc:TermInfo" minOccurs="0" maxOccurs="unbounded"/>
-        </xs:sequence>
-      </xs:complexType>
-    </xs:element>
-    <xs:element name="TermInfo">
-      <xs:complexType>
-        <xs:sequence>
-          <xs:element ref="pc:TermName" minOccurs="0"/>
-          <xs:element ref="pc:TermId" minOccurs="0"/>
-        </xs:sequence>
-      </xs:complexType>
-    </xs:element>
-    <xs:element name="TermName" type="xs:string"/>
-    <xs:element name="TermId" type="xs:string"/>
-  </xs:schema>
-</ct:contentTypeSchema>
+<?mso-contentType ?>
+<FormTemplates xmlns="http://schemas.microsoft.com/sharepoint/v3/contenttype/forms">
+  <Display>DocumentLibraryForm</Display>
+  <Edit>AssetEditForm</Edit>
+  <New>DocumentLibraryForm</New>
+</FormTemplates>
 </file>
 
 <file path=customXml/item2.xml><?xml version="1.0" encoding="utf-8"?>
@@ -8560,28 +7487,1049 @@
 </file>
 
 <file path=customXml/item3.xml><?xml version="1.0" encoding="utf-8"?>
-<?mso-contentType ?>
-<FormTemplates xmlns="http://schemas.microsoft.com/sharepoint/v3/contenttype/forms">
-  <Display>DocumentLibraryForm</Display>
-  <Edit>AssetEditForm</Edit>
-  <New>DocumentLibraryForm</New>
-</FormTemplates>
+<ct:contentTypeSchema xmlns:ct="http://schemas.microsoft.com/office/2006/metadata/contentType" xmlns:ma="http://schemas.microsoft.com/office/2006/metadata/properties/metaAttributes" ct:_="" ma:_="" ma:contentTypeName="TemplateFile" ma:contentTypeID="0x0101006EDDDB5EE6D98C44930B742096920B300400F5B6D36B3EF94B4E9A635CDF2A18F5B8" ma:contentTypeVersion="72" ma:contentTypeDescription="Create a new document." ma:contentTypeScope="" ma:versionID="a23e56308344d904b51738559c3d67c9">
+  <xsd:schema xmlns:xsd="http://www.w3.org/2001/XMLSchema" xmlns:xs="http://www.w3.org/2001/XMLSchema" xmlns:p="http://schemas.microsoft.com/office/2006/metadata/properties" xmlns:ns2="4873beb7-5857-4685-be1f-d57550cc96cc" targetNamespace="http://schemas.microsoft.com/office/2006/metadata/properties" ma:root="true" ma:fieldsID="cd0908cc4600e77bf5da051303e00c8d" ns2:_="">
+    <xsd:import namespace="4873beb7-5857-4685-be1f-d57550cc96cc"/>
+    <xsd:element name="properties">
+      <xsd:complexType>
+        <xsd:sequence>
+          <xsd:element name="documentManagement">
+            <xsd:complexType>
+              <xsd:all>
+                <xsd:element ref="ns2:AcquiredFrom" minOccurs="0"/>
+                <xsd:element ref="ns2:UACurrentWords" minOccurs="0"/>
+                <xsd:element ref="ns2:TPApplication" minOccurs="0"/>
+                <xsd:element ref="ns2:ApprovalLog" minOccurs="0"/>
+                <xsd:element ref="ns2:ApprovalStatus" minOccurs="0"/>
+                <xsd:element ref="ns2:AssetStart" minOccurs="0"/>
+                <xsd:element ref="ns2:AssetExpire" minOccurs="0"/>
+                <xsd:element ref="ns2:AssetId" minOccurs="0"/>
+                <xsd:element ref="ns2:IsSearchable" minOccurs="0"/>
+                <xsd:element ref="ns2:AssetType" minOccurs="0"/>
+                <xsd:element ref="ns2:APAuthor" minOccurs="0"/>
+                <xsd:element ref="ns2:AverageRating" minOccurs="0"/>
+                <xsd:element ref="ns2:BlockPublish" minOccurs="0"/>
+                <xsd:element ref="ns2:BugNumber" minOccurs="0"/>
+                <xsd:element ref="ns2:CampaignTagsTaxHTField0" minOccurs="0"/>
+                <xsd:element ref="ns2:TPClientViewer" minOccurs="0"/>
+                <xsd:element ref="ns2:ClipArtFilename" minOccurs="0"/>
+                <xsd:element ref="ns2:TPCommandLine" minOccurs="0"/>
+                <xsd:element ref="ns2:TPComponent" minOccurs="0"/>
+                <xsd:element ref="ns2:ContentItem" minOccurs="0"/>
+                <xsd:element ref="ns2:CrawlForDependencies" minOccurs="0"/>
+                <xsd:element ref="ns2:CSXHash" minOccurs="0"/>
+                <xsd:element ref="ns2:CSXSubmissionMarket" minOccurs="0"/>
+                <xsd:element ref="ns2:CSXUpdate" minOccurs="0"/>
+                <xsd:element ref="ns2:IntlLangReviewDate" minOccurs="0"/>
+                <xsd:element ref="ns2:IsDeleted" minOccurs="0"/>
+                <xsd:element ref="ns2:APDescription" minOccurs="0"/>
+                <xsd:element ref="ns2:DirectSourceMarket" minOccurs="0"/>
+                <xsd:element ref="ns2:Downloads" minOccurs="0"/>
+                <xsd:element ref="ns2:DSATActionTaken" minOccurs="0"/>
+                <xsd:element ref="ns2:APEditor" minOccurs="0"/>
+                <xsd:element ref="ns2:EditorialStatus" minOccurs="0"/>
+                <xsd:element ref="ns2:EditorialTags" minOccurs="0"/>
+                <xsd:element ref="ns2:TPExecutable" minOccurs="0"/>
+                <xsd:element ref="ns2:FeatureTagsTaxHTField0" minOccurs="0"/>
+                <xsd:element ref="ns2:TPFriendlyName" minOccurs="0"/>
+                <xsd:element ref="ns2:FriendlyTitle" minOccurs="0"/>
+                <xsd:element ref="ns2:PrimaryImageGen" minOccurs="0"/>
+                <xsd:element ref="ns2:HandoffToMSDN" minOccurs="0"/>
+                <xsd:element ref="ns2:InProjectListLookup" minOccurs="0"/>
+                <xsd:element ref="ns2:TPInstallLocation" minOccurs="0"/>
+                <xsd:element ref="ns2:InternalTagsTaxHTField0" minOccurs="0"/>
+                <xsd:element ref="ns2:IntlLangReview" minOccurs="0"/>
+                <xsd:element ref="ns2:IntlLangReviewer" minOccurs="0"/>
+                <xsd:element ref="ns2:MarketSpecific" minOccurs="0"/>
+                <xsd:element ref="ns2:LastCompleteVersionLookup" minOccurs="0"/>
+                <xsd:element ref="ns2:LastHandOff" minOccurs="0"/>
+                <xsd:element ref="ns2:LastModifiedDateTime" minOccurs="0"/>
+                <xsd:element ref="ns2:LastPreviewErrorLookup" minOccurs="0"/>
+                <xsd:element ref="ns2:LastPreviewResultLookup" minOccurs="0"/>
+                <xsd:element ref="ns2:LastPreviewAttemptDateLookup" minOccurs="0"/>
+                <xsd:element ref="ns2:LastPreviewedByLookup" minOccurs="0"/>
+                <xsd:element ref="ns2:LastPreviewTimeLookup" minOccurs="0"/>
+                <xsd:element ref="ns2:LastPreviewVersionLookup" minOccurs="0"/>
+                <xsd:element ref="ns2:LastPublishErrorLookup" minOccurs="0"/>
+                <xsd:element ref="ns2:LastPublishResultLookup" minOccurs="0"/>
+                <xsd:element ref="ns2:LastPublishAttemptDateLookup" minOccurs="0"/>
+                <xsd:element ref="ns2:LastPublishedByLookup" minOccurs="0"/>
+                <xsd:element ref="ns2:LastPublishTimeLookup" minOccurs="0"/>
+                <xsd:element ref="ns2:LastPublishVersionLookup" minOccurs="0"/>
+                <xsd:element ref="ns2:TPLaunchHelpLinkType" minOccurs="0"/>
+                <xsd:element ref="ns2:LegacyData" minOccurs="0"/>
+                <xsd:element ref="ns2:TPLaunchHelpLink" minOccurs="0"/>
+                <xsd:element ref="ns2:LocComments" minOccurs="0"/>
+                <xsd:element ref="ns2:LocLastLocAttemptVersionLookup" minOccurs="0"/>
+                <xsd:element ref="ns2:LocLastLocAttemptVersionTypeLookup" minOccurs="0"/>
+                <xsd:element ref="ns2:LocManualTestRequired" minOccurs="0"/>
+                <xsd:element ref="ns2:LocMarketGroupTiers2" minOccurs="0"/>
+                <xsd:element ref="ns2:LocNewPublishedVersionLookup" minOccurs="0"/>
+                <xsd:element ref="ns2:LocOverallHandbackStatusLookup" minOccurs="0"/>
+                <xsd:element ref="ns2:LocOverallLocStatusLookup" minOccurs="0"/>
+                <xsd:element ref="ns2:LocOverallPreviewStatusLookup" minOccurs="0"/>
+                <xsd:element ref="ns2:LocOverallPublishStatusLookup" minOccurs="0"/>
+                <xsd:element ref="ns2:IntlLocPriority" minOccurs="0"/>
+                <xsd:element ref="ns2:LocProcessedForHandoffsLookup" minOccurs="0"/>
+                <xsd:element ref="ns2:LocProcessedForMarketsLookup" minOccurs="0"/>
+                <xsd:element ref="ns2:LocPublishedDependentAssetsLookup" minOccurs="0"/>
+                <xsd:element ref="ns2:LocPublishedLinkedAssetsLookup" minOccurs="0"/>
+                <xsd:element ref="ns2:LocRecommendedHandoff" minOccurs="0"/>
+                <xsd:element ref="ns2:LocalizationTagsTaxHTField0" minOccurs="0"/>
+                <xsd:element ref="ns2:MachineTranslated" minOccurs="0"/>
+                <xsd:element ref="ns2:Manager" minOccurs="0"/>
+                <xsd:element ref="ns2:Markets" minOccurs="0"/>
+                <xsd:element ref="ns2:Milestone" minOccurs="0"/>
+                <xsd:element ref="ns2:TPNamespace" minOccurs="0"/>
+                <xsd:element ref="ns2:NumericId" minOccurs="0"/>
+                <xsd:element ref="ns2:NumOfRatingsLookup" minOccurs="0"/>
+                <xsd:element ref="ns2:OOCacheId" minOccurs="0"/>
+                <xsd:element ref="ns2:OpenTemplate" minOccurs="0"/>
+                <xsd:element ref="ns2:OriginAsset" minOccurs="0"/>
+                <xsd:element ref="ns2:OriginalRelease" minOccurs="0"/>
+                <xsd:element ref="ns2:OriginalSourceMarket" minOccurs="0"/>
+                <xsd:element ref="ns2:OutputCachingOn" minOccurs="0"/>
+                <xsd:element ref="ns2:ParentAssetId" minOccurs="0"/>
+                <xsd:element ref="ns2:PlannedPubDate" minOccurs="0"/>
+                <xsd:element ref="ns2:PolicheckWords" minOccurs="0"/>
+                <xsd:element ref="ns2:BusinessGroup" minOccurs="0"/>
+                <xsd:element ref="ns2:UAProjectedTotalWords" minOccurs="0"/>
+                <xsd:element ref="ns2:Provider" minOccurs="0"/>
+                <xsd:element ref="ns2:Providers" minOccurs="0"/>
+                <xsd:element ref="ns2:PublishStatusLookup" minOccurs="0"/>
+                <xsd:element ref="ns2:PublishTargets" minOccurs="0"/>
+                <xsd:element ref="ns2:RecommendationsModifier" minOccurs="0"/>
+                <xsd:element ref="ns2:ArtSampleDocs" minOccurs="0"/>
+                <xsd:element ref="ns2:ScenarioTagsTaxHTField0" minOccurs="0"/>
+                <xsd:element ref="ns2:ShowIn" minOccurs="0"/>
+                <xsd:element ref="ns2:SourceTitle" minOccurs="0"/>
+                <xsd:element ref="ns2:CSXSubmissionDate" minOccurs="0"/>
+                <xsd:element ref="ns2:SubmitterId" minOccurs="0"/>
+                <xsd:element ref="ns2:TaxCatchAll" minOccurs="0"/>
+                <xsd:element ref="ns2:TaxCatchAllLabel" minOccurs="0"/>
+                <xsd:element ref="ns2:TemplateStatus" minOccurs="0"/>
+                <xsd:element ref="ns2:TemplateTemplateType" minOccurs="0"/>
+                <xsd:element ref="ns2:ThumbnailAssetId" minOccurs="0"/>
+                <xsd:element ref="ns2:TimesCloned" minOccurs="0"/>
+                <xsd:element ref="ns2:TrustLevel" minOccurs="0"/>
+                <xsd:element ref="ns2:UALocComments" minOccurs="0"/>
+                <xsd:element ref="ns2:UALocRecommendation" minOccurs="0"/>
+                <xsd:element ref="ns2:UANotes" minOccurs="0"/>
+                <xsd:element ref="ns2:TPAppVersion" minOccurs="0"/>
+                <xsd:element ref="ns2:VoteCount" minOccurs="0"/>
+              </xsd:all>
+            </xsd:complexType>
+          </xsd:element>
+        </xsd:sequence>
+      </xsd:complexType>
+    </xsd:element>
+  </xsd:schema>
+  <xsd:schema xmlns:xsd="http://www.w3.org/2001/XMLSchema" xmlns:xs="http://www.w3.org/2001/XMLSchema" xmlns:dms="http://schemas.microsoft.com/office/2006/documentManagement/types" xmlns:pc="http://schemas.microsoft.com/office/infopath/2007/PartnerControls" targetNamespace="4873beb7-5857-4685-be1f-d57550cc96cc" elementFormDefault="qualified">
+    <xsd:import namespace="http://schemas.microsoft.com/office/2006/documentManagement/types"/>
+    <xsd:import namespace="http://schemas.microsoft.com/office/infopath/2007/PartnerControls"/>
+    <xsd:element name="AcquiredFrom" ma:index="1" nillable="true" ma:displayName="Acquired From" ma:default="Internal MS" ma:internalName="AcquiredFrom" ma:readOnly="false">
+      <xsd:simpleType>
+        <xsd:restriction base="dms:Choice">
+          <xsd:enumeration value="Internal MS"/>
+          <xsd:enumeration value="Community"/>
+          <xsd:enumeration value="MVP"/>
+          <xsd:enumeration value="Publisher"/>
+          <xsd:enumeration value="Partner"/>
+          <xsd:enumeration value="None"/>
+        </xsd:restriction>
+      </xsd:simpleType>
+    </xsd:element>
+    <xsd:element name="UACurrentWords" ma:index="2" nillable="true" ma:displayName="Actual Word Count" ma:default="" ma:internalName="UACurrentWords" ma:readOnly="false">
+      <xsd:simpleType>
+        <xsd:restriction base="dms:Unknown"/>
+      </xsd:simpleType>
+    </xsd:element>
+    <xsd:element name="TPApplication" ma:index="3" nillable="true" ma:displayName="Application to Open Template With" ma:default="" ma:internalName="TPApplication">
+      <xsd:simpleType>
+        <xsd:restriction base="dms:Text"/>
+      </xsd:simpleType>
+    </xsd:element>
+    <xsd:element name="ApprovalLog" ma:index="4" nillable="true" ma:displayName="Approval Log" ma:default="" ma:hidden="true" ma:internalName="ApprovalLog" ma:readOnly="false">
+      <xsd:simpleType>
+        <xsd:restriction base="dms:Note"/>
+      </xsd:simpleType>
+    </xsd:element>
+    <xsd:element name="ApprovalStatus" ma:index="5" nillable="true" ma:displayName="Approval Status" ma:default="InProgress" ma:internalName="ApprovalStatus" ma:readOnly="false">
+      <xsd:simpleType>
+        <xsd:restriction base="dms:Choice">
+          <xsd:enumeration value="InProgress"/>
+          <xsd:enumeration value="Rejected"/>
+          <xsd:enumeration value="Questionable"/>
+          <xsd:enumeration value="ApprovedAutomatic"/>
+          <xsd:enumeration value="ApprovedManual"/>
+          <xsd:enumeration value="On Hold"/>
+          <xsd:enumeration value="Needs Review"/>
+          <xsd:enumeration value="A Violation"/>
+          <xsd:enumeration value="Unpublished Violation"/>
+        </xsd:restriction>
+      </xsd:simpleType>
+    </xsd:element>
+    <xsd:element name="AssetStart" ma:index="6" nillable="true" ma:displayName="Asset Begin Date" ma:default="[Today]" ma:internalName="AssetStart" ma:readOnly="false">
+      <xsd:simpleType>
+        <xsd:restriction base="dms:DateTime"/>
+      </xsd:simpleType>
+    </xsd:element>
+    <xsd:element name="AssetExpire" ma:index="7" nillable="true" ma:displayName="Asset End Date" ma:default="2029-01-01T08:00:00Z" ma:format="DateTime" ma:internalName="AssetExpire" ma:readOnly="false">
+      <xsd:simpleType>
+        <xsd:restriction base="dms:DateTime"/>
+      </xsd:simpleType>
+    </xsd:element>
+    <xsd:element name="AssetId" ma:index="8" nillable="true" ma:displayName="Asset ID" ma:default="" ma:indexed="true" ma:internalName="AssetId" ma:readOnly="false">
+      <xsd:simpleType>
+        <xsd:restriction base="dms:Text">
+          <xsd:maxLength value="255"/>
+        </xsd:restriction>
+      </xsd:simpleType>
+    </xsd:element>
+    <xsd:element name="IsSearchable" ma:index="9" nillable="true" ma:displayName="Asset Searchable?" ma:default="true" ma:internalName="IsSearchable" ma:readOnly="false">
+      <xsd:simpleType>
+        <xsd:restriction base="dms:Boolean"/>
+      </xsd:simpleType>
+    </xsd:element>
+    <xsd:element name="AssetType" ma:index="10" nillable="true" ma:displayName="Asset Type" ma:default="" ma:internalName="AssetType" ma:readOnly="false">
+      <xsd:simpleType>
+        <xsd:restriction base="dms:Unknown"/>
+      </xsd:simpleType>
+    </xsd:element>
+    <xsd:element name="APAuthor" ma:index="11" nillable="true" ma:displayName="Author" ma:default="" ma:list="UserInfo" ma:internalName="APAuthor" ma:readOnly="false">
+      <xsd:complexType>
+        <xsd:complexContent>
+          <xsd:extension base="dms:User">
+            <xsd:sequence>
+              <xsd:element name="UserInfo" minOccurs="0" maxOccurs="unbounded">
+                <xsd:complexType>
+                  <xsd:sequence>
+                    <xsd:element name="DisplayName" type="xsd:string" minOccurs="0"/>
+                    <xsd:element name="AccountId" type="dms:UserId" minOccurs="0" nillable="true"/>
+                    <xsd:element name="AccountType" type="xsd:string" minOccurs="0"/>
+                  </xsd:sequence>
+                </xsd:complexType>
+              </xsd:element>
+            </xsd:sequence>
+          </xsd:extension>
+        </xsd:complexContent>
+      </xsd:complexType>
+    </xsd:element>
+    <xsd:element name="AverageRating" ma:index="12" nillable="true" ma:displayName="Average Rating" ma:internalName="AverageRating" ma:readOnly="false">
+      <xsd:simpleType>
+        <xsd:restriction base="dms:Text"/>
+      </xsd:simpleType>
+    </xsd:element>
+    <xsd:element name="BlockPublish" ma:index="13" nillable="true" ma:displayName="Block from Publishing?" ma:default="" ma:internalName="BlockPublish" ma:readOnly="false">
+      <xsd:simpleType>
+        <xsd:restriction base="dms:Boolean"/>
+      </xsd:simpleType>
+    </xsd:element>
+    <xsd:element name="BugNumber" ma:index="14" nillable="true" ma:displayName="Bug Number" ma:default="" ma:internalName="BugNumber" ma:readOnly="false">
+      <xsd:simpleType>
+        <xsd:restriction base="dms:Text"/>
+      </xsd:simpleType>
+    </xsd:element>
+    <xsd:element name="CampaignTagsTaxHTField0" ma:index="16" nillable="true" ma:taxonomy="true" ma:internalName="CampaignTagsTaxHTField0" ma:taxonomyFieldName="CampaignTags" ma:displayName="Campaigns" ma:readOnly="false" ma:default="" ma:fieldId="{1df42cc3-2301-4f11-a52a-6ead923c29ed}" ma:taxonomyMulti="true" ma:sspId="8f79753a-75d3-41f5-8ca3-40b843941b4f" ma:termSetId="ca0e50d4-faa1-44ce-961e-bb1441c60e66" ma:anchorId="00000000-0000-0000-0000-000000000000" ma:open="false" ma:isKeyword="false">
+      <xsd:complexType>
+        <xsd:sequence>
+          <xsd:element ref="pc:Terms" minOccurs="0" maxOccurs="1"/>
+        </xsd:sequence>
+      </xsd:complexType>
+    </xsd:element>
+    <xsd:element name="TPClientViewer" ma:index="17" nillable="true" ma:displayName="Client Viewer" ma:default="" ma:internalName="TPClientViewer">
+      <xsd:simpleType>
+        <xsd:restriction base="dms:Text"/>
+      </xsd:simpleType>
+    </xsd:element>
+    <xsd:element name="ClipArtFilename" ma:index="18" nillable="true" ma:displayName="Clip Art Name" ma:default="" ma:internalName="ClipArtFilename" ma:readOnly="false">
+      <xsd:simpleType>
+        <xsd:restriction base="dms:Text"/>
+      </xsd:simpleType>
+    </xsd:element>
+    <xsd:element name="TPCommandLine" ma:index="19" nillable="true" ma:displayName="Command Line" ma:default="" ma:internalName="TPCommandLine">
+      <xsd:simpleType>
+        <xsd:restriction base="dms:Text"/>
+      </xsd:simpleType>
+    </xsd:element>
+    <xsd:element name="TPComponent" ma:index="20" nillable="true" ma:displayName="Component" ma:default="" ma:internalName="TPComponent">
+      <xsd:simpleType>
+        <xsd:restriction base="dms:Text"/>
+      </xsd:simpleType>
+    </xsd:element>
+    <xsd:element name="ContentItem" ma:index="21" nillable="true" ma:displayName="Content Item" ma:default="" ma:hidden="true" ma:internalName="ContentItem" ma:readOnly="false">
+      <xsd:simpleType>
+        <xsd:restriction base="dms:Unknown"/>
+      </xsd:simpleType>
+    </xsd:element>
+    <xsd:element name="CrawlForDependencies" ma:index="23" nillable="true" ma:displayName="Crawl for Dependencies?" ma:default="true" ma:internalName="CrawlForDependencies" ma:readOnly="false">
+      <xsd:simpleType>
+        <xsd:restriction base="dms:Boolean"/>
+      </xsd:simpleType>
+    </xsd:element>
+    <xsd:element name="CSXHash" ma:index="26" nillable="true" ma:displayName="CSX Hash" ma:default="" ma:indexed="true" ma:internalName="CSXHash" ma:readOnly="false">
+      <xsd:simpleType>
+        <xsd:restriction base="dms:Text"/>
+      </xsd:simpleType>
+    </xsd:element>
+    <xsd:element name="CSXSubmissionMarket" ma:index="27" nillable="true" ma:displayName="CSX Submission Market" ma:default="" ma:list="{2FBD1B11-2ACE-4FDC-B5A3-635D4ADF6F1B}" ma:internalName="CSXSubmissionMarket" ma:readOnly="false" ma:showField="MarketName" ma:web="4873beb7-5857-4685-be1f-d57550cc96cc">
+      <xsd:simpleType>
+        <xsd:restriction base="dms:Lookup"/>
+      </xsd:simpleType>
+    </xsd:element>
+    <xsd:element name="CSXUpdate" ma:index="28" nillable="true" ma:displayName="CSX Updated?" ma:default="false" ma:internalName="CSXUpdate" ma:readOnly="false">
+      <xsd:simpleType>
+        <xsd:restriction base="dms:Boolean"/>
+      </xsd:simpleType>
+    </xsd:element>
+    <xsd:element name="IntlLangReviewDate" ma:index="29" nillable="true" ma:displayName="Date to Complete Intl QA" ma:default="" ma:internalName="IntlLangReviewDate" ma:readOnly="false">
+      <xsd:simpleType>
+        <xsd:restriction base="dms:DateTime"/>
+      </xsd:simpleType>
+    </xsd:element>
+    <xsd:element name="IsDeleted" ma:index="30" nillable="true" ma:displayName="Deleted?" ma:default="" ma:internalName="IsDeleted" ma:readOnly="false">
+      <xsd:simpleType>
+        <xsd:restriction base="dms:Boolean"/>
+      </xsd:simpleType>
+    </xsd:element>
+    <xsd:element name="APDescription" ma:index="31" nillable="true" ma:displayName="Description" ma:default="" ma:internalName="APDescription" ma:readOnly="false">
+      <xsd:simpleType>
+        <xsd:restriction base="dms:Note"/>
+      </xsd:simpleType>
+    </xsd:element>
+    <xsd:element name="DirectSourceMarket" ma:index="32" nillable="true" ma:displayName="Direct Source Market Group" ma:default="" ma:internalName="DirectSourceMarket" ma:readOnly="false">
+      <xsd:simpleType>
+        <xsd:restriction base="dms:Text"/>
+      </xsd:simpleType>
+    </xsd:element>
+    <xsd:element name="Downloads" ma:index="33" nillable="true" ma:displayName="Downloads" ma:default="0" ma:hidden="true" ma:internalName="Downloads" ma:readOnly="false">
+      <xsd:simpleType>
+        <xsd:restriction base="dms:Unknown"/>
+      </xsd:simpleType>
+    </xsd:element>
+    <xsd:element name="DSATActionTaken" ma:index="34" nillable="true" ma:displayName="DSAT Action Taken" ma:default="" ma:internalName="DSATActionTaken" ma:readOnly="false">
+      <xsd:simpleType>
+        <xsd:restriction base="dms:Choice">
+          <xsd:enumeration value="Best Bets"/>
+          <xsd:enumeration value="Expire"/>
+          <xsd:enumeration value="Hide"/>
+          <xsd:enumeration value="None"/>
+        </xsd:restriction>
+      </xsd:simpleType>
+    </xsd:element>
+    <xsd:element name="APEditor" ma:index="35" nillable="true" ma:displayName="Editor" ma:default="" ma:list="UserInfo" ma:internalName="APEditor" ma:readOnly="false">
+      <xsd:complexType>
+        <xsd:complexContent>
+          <xsd:extension base="dms:User">
+            <xsd:sequence>
+              <xsd:element name="UserInfo" minOccurs="0" maxOccurs="unbounded">
+                <xsd:complexType>
+                  <xsd:sequence>
+                    <xsd:element name="DisplayName" type="xsd:string" minOccurs="0"/>
+                    <xsd:element name="AccountId" type="dms:UserId" minOccurs="0" nillable="true"/>
+                    <xsd:element name="AccountType" type="xsd:string" minOccurs="0"/>
+                  </xsd:sequence>
+                </xsd:complexType>
+              </xsd:element>
+            </xsd:sequence>
+          </xsd:extension>
+        </xsd:complexContent>
+      </xsd:complexType>
+    </xsd:element>
+    <xsd:element name="EditorialStatus" ma:index="36" nillable="true" ma:displayName="Editorial Status" ma:default="" ma:internalName="EditorialStatus" ma:readOnly="false">
+      <xsd:simpleType>
+        <xsd:restriction base="dms:Unknown"/>
+      </xsd:simpleType>
+    </xsd:element>
+    <xsd:element name="EditorialTags" ma:index="37" nillable="true" ma:displayName="Editorial Tags" ma:default="" ma:internalName="EditorialTags">
+      <xsd:simpleType>
+        <xsd:restriction base="dms:Unknown"/>
+      </xsd:simpleType>
+    </xsd:element>
+    <xsd:element name="TPExecutable" ma:index="38" nillable="true" ma:displayName="Executable" ma:default="" ma:internalName="TPExecutable">
+      <xsd:simpleType>
+        <xsd:restriction base="dms:Text"/>
+      </xsd:simpleType>
+    </xsd:element>
+    <xsd:element name="FeatureTagsTaxHTField0" ma:index="40" nillable="true" ma:taxonomy="true" ma:internalName="FeatureTagsTaxHTField0" ma:taxonomyFieldName="FeatureTags" ma:displayName="Features" ma:readOnly="false" ma:default="" ma:fieldId="{7fc0d542-15c6-4882-a8e3-13bca44403fb}" ma:taxonomyMulti="true" ma:sspId="8f79753a-75d3-41f5-8ca3-40b843941b4f" ma:termSetId="f1ab6845-967d-4854-a0ba-4ec07f0f8113" ma:anchorId="00000000-0000-0000-0000-000000000000" ma:open="false" ma:isKeyword="false">
+      <xsd:complexType>
+        <xsd:sequence>
+          <xsd:element ref="pc:Terms" minOccurs="0" maxOccurs="1"/>
+        </xsd:sequence>
+      </xsd:complexType>
+    </xsd:element>
+    <xsd:element name="TPFriendlyName" ma:index="41" nillable="true" ma:displayName="Friendly Name" ma:default="" ma:internalName="TPFriendlyName">
+      <xsd:simpleType>
+        <xsd:restriction base="dms:Text"/>
+      </xsd:simpleType>
+    </xsd:element>
+    <xsd:element name="FriendlyTitle" ma:index="42" nillable="true" ma:displayName="Friendly Title" ma:default="" ma:description="Shorter title to be used when displaying search results" ma:internalName="FriendlyTitle" ma:readOnly="false">
+      <xsd:simpleType>
+        <xsd:restriction base="dms:Text"/>
+      </xsd:simpleType>
+    </xsd:element>
+    <xsd:element name="PrimaryImageGen" ma:index="43" nillable="true" ma:displayName="Generate Images?" ma:default="true" ma:internalName="PrimaryImageGen">
+      <xsd:simpleType>
+        <xsd:restriction base="dms:Boolean"/>
+      </xsd:simpleType>
+    </xsd:element>
+    <xsd:element name="HandoffToMSDN" ma:index="44" nillable="true" ma:displayName="Handoff To MSDN Date" ma:default="" ma:internalName="HandoffToMSDN" ma:readOnly="false">
+      <xsd:simpleType>
+        <xsd:restriction base="dms:DateTime"/>
+      </xsd:simpleType>
+    </xsd:element>
+    <xsd:element name="InProjectListLookup" ma:index="45" nillable="true" ma:displayName="InProjectListLookup" ma:list="{9E343742-310B-4684-A24C-1D137CB4B230}" ma:internalName="InProjectListLookup" ma:readOnly="true" ma:showField="InProjectList" ma:web="4873beb7-5857-4685-be1f-d57550cc96cc">
+      <xsd:complexType>
+        <xsd:complexContent>
+          <xsd:extension base="dms:MultiChoiceLookup">
+            <xsd:sequence>
+              <xsd:element name="Value" type="dms:Lookup" maxOccurs="unbounded" minOccurs="0" nillable="true"/>
+            </xsd:sequence>
+          </xsd:extension>
+        </xsd:complexContent>
+      </xsd:complexType>
+    </xsd:element>
+    <xsd:element name="TPInstallLocation" ma:index="46" nillable="true" ma:displayName="Install Location" ma:default="" ma:internalName="TPInstallLocation">
+      <xsd:simpleType>
+        <xsd:restriction base="dms:Text"/>
+      </xsd:simpleType>
+    </xsd:element>
+    <xsd:element name="InternalTagsTaxHTField0" ma:index="48" nillable="true" ma:taxonomy="true" ma:internalName="InternalTagsTaxHTField0" ma:taxonomyFieldName="InternalTags" ma:displayName="Internal Tags" ma:readOnly="false" ma:default="" ma:fieldId="{1490b8a4-2706-41ec-b5e3-73176dccf34e}" ma:taxonomyMulti="true" ma:sspId="8f79753a-75d3-41f5-8ca3-40b843941b4f" ma:termSetId="82b6639e-f7fc-4c18-ad2d-003a6e707765" ma:anchorId="00000000-0000-0000-0000-000000000000" ma:open="false" ma:isKeyword="false">
+      <xsd:complexType>
+        <xsd:sequence>
+          <xsd:element ref="pc:Terms" minOccurs="0" maxOccurs="1"/>
+        </xsd:sequence>
+      </xsd:complexType>
+    </xsd:element>
+    <xsd:element name="IntlLangReview" ma:index="49" nillable="true" ma:displayName="Intl Lang QA Review Required?" ma:default="" ma:internalName="IntlLangReview" ma:readOnly="false">
+      <xsd:simpleType>
+        <xsd:restriction base="dms:Boolean"/>
+      </xsd:simpleType>
+    </xsd:element>
+    <xsd:element name="IntlLangReviewer" ma:index="50" nillable="true" ma:displayName="Intl Lang QA Reviewer" ma:default="" ma:internalName="IntlLangReviewer" ma:readOnly="false">
+      <xsd:simpleType>
+        <xsd:restriction base="dms:Text"/>
+      </xsd:simpleType>
+    </xsd:element>
+    <xsd:element name="MarketSpecific" ma:index="51" nillable="true" ma:displayName="Is Market Specific?" ma:default="" ma:internalName="MarketSpecific" ma:readOnly="false">
+      <xsd:simpleType>
+        <xsd:restriction base="dms:Boolean"/>
+      </xsd:simpleType>
+    </xsd:element>
+    <xsd:element name="LastCompleteVersionLookup" ma:index="52" nillable="true" ma:displayName="Last Complete Version Lookup" ma:default="" ma:list="{9E343742-310B-4684-A24C-1D137CB4B230}" ma:internalName="LastCompleteVersionLookup" ma:readOnly="true" ma:showField="LastCompleteVersion" ma:web="4873beb7-5857-4685-be1f-d57550cc96cc">
+      <xsd:complexType>
+        <xsd:complexContent>
+          <xsd:extension base="dms:MultiChoiceLookup">
+            <xsd:sequence>
+              <xsd:element name="Value" type="dms:Lookup" maxOccurs="unbounded" minOccurs="0" nillable="true"/>
+            </xsd:sequence>
+          </xsd:extension>
+        </xsd:complexContent>
+      </xsd:complexType>
+    </xsd:element>
+    <xsd:element name="LastHandOff" ma:index="53" nillable="true" ma:displayName="Last Hand-off" ma:default="" ma:internalName="LastHandOff" ma:readOnly="false">
+      <xsd:simpleType>
+        <xsd:restriction base="dms:DateTime"/>
+      </xsd:simpleType>
+    </xsd:element>
+    <xsd:element name="LastModifiedDateTime" ma:index="54" nillable="true" ma:displayName="Last Modified Date" ma:default="" ma:internalName="LastModifiedDateTime" ma:readOnly="false">
+      <xsd:simpleType>
+        <xsd:restriction base="dms:DateTime"/>
+      </xsd:simpleType>
+    </xsd:element>
+    <xsd:element name="LastPreviewErrorLookup" ma:index="55" nillable="true" ma:displayName="Last Preview Attempt Error" ma:default="" ma:list="{9E343742-310B-4684-A24C-1D137CB4B230}" ma:internalName="LastPreviewErrorLookup" ma:readOnly="true" ma:showField="LastPreviewError" ma:web="4873beb7-5857-4685-be1f-d57550cc96cc">
+      <xsd:complexType>
+        <xsd:complexContent>
+          <xsd:extension base="dms:MultiChoiceLookup">
+            <xsd:sequence>
+              <xsd:element name="Value" type="dms:Lookup" maxOccurs="unbounded" minOccurs="0" nillable="true"/>
+            </xsd:sequence>
+          </xsd:extension>
+        </xsd:complexContent>
+      </xsd:complexType>
+    </xsd:element>
+    <xsd:element name="LastPreviewResultLookup" ma:index="56" nillable="true" ma:displayName="Last Preview Attempt Result" ma:default="" ma:list="{9E343742-310B-4684-A24C-1D137CB4B230}" ma:internalName="LastPreviewResultLookup" ma:readOnly="true" ma:showField="LastPreviewResult" ma:web="4873beb7-5857-4685-be1f-d57550cc96cc">
+      <xsd:complexType>
+        <xsd:complexContent>
+          <xsd:extension base="dms:MultiChoiceLookup">
+            <xsd:sequence>
+              <xsd:element name="Value" type="dms:Lookup" maxOccurs="unbounded" minOccurs="0" nillable="true"/>
+            </xsd:sequence>
+          </xsd:extension>
+        </xsd:complexContent>
+      </xsd:complexType>
+    </xsd:element>
+    <xsd:element name="LastPreviewAttemptDateLookup" ma:index="57" nillable="true" ma:displayName="Last Preview Attempted On" ma:default="" ma:list="{9E343742-310B-4684-A24C-1D137CB4B230}" ma:internalName="LastPreviewAttemptDateLookup" ma:readOnly="true" ma:showField="LastPreviewAttemptDate" ma:web="4873beb7-5857-4685-be1f-d57550cc96cc">
+      <xsd:complexType>
+        <xsd:complexContent>
+          <xsd:extension base="dms:MultiChoiceLookup">
+            <xsd:sequence>
+              <xsd:element name="Value" type="dms:Lookup" maxOccurs="unbounded" minOccurs="0" nillable="true"/>
+            </xsd:sequence>
+          </xsd:extension>
+        </xsd:complexContent>
+      </xsd:complexType>
+    </xsd:element>
+    <xsd:element name="LastPreviewedByLookup" ma:index="58" nillable="true" ma:displayName="Last Previewed By" ma:default="" ma:list="{9E343742-310B-4684-A24C-1D137CB4B230}" ma:internalName="LastPreviewedByLookup" ma:readOnly="true" ma:showField="LastPreviewedBy" ma:web="4873beb7-5857-4685-be1f-d57550cc96cc">
+      <xsd:complexType>
+        <xsd:complexContent>
+          <xsd:extension base="dms:MultiChoiceLookup">
+            <xsd:sequence>
+              <xsd:element name="Value" type="dms:Lookup" maxOccurs="unbounded" minOccurs="0" nillable="true"/>
+            </xsd:sequence>
+          </xsd:extension>
+        </xsd:complexContent>
+      </xsd:complexType>
+    </xsd:element>
+    <xsd:element name="LastPreviewTimeLookup" ma:index="59" nillable="true" ma:displayName="Last Previewed Date" ma:default="" ma:list="{9E343742-310B-4684-A24C-1D137CB4B230}" ma:internalName="LastPreviewTimeLookup" ma:readOnly="true" ma:showField="LastPreviewTime" ma:web="4873beb7-5857-4685-be1f-d57550cc96cc">
+      <xsd:complexType>
+        <xsd:complexContent>
+          <xsd:extension base="dms:MultiChoiceLookup">
+            <xsd:sequence>
+              <xsd:element name="Value" type="dms:Lookup" maxOccurs="unbounded" minOccurs="0" nillable="true"/>
+            </xsd:sequence>
+          </xsd:extension>
+        </xsd:complexContent>
+      </xsd:complexType>
+    </xsd:element>
+    <xsd:element name="LastPreviewVersionLookup" ma:index="60" nillable="true" ma:displayName="Last Previewed Version" ma:default="" ma:list="{9E343742-310B-4684-A24C-1D137CB4B230}" ma:internalName="LastPreviewVersionLookup" ma:readOnly="true" ma:showField="LastPreviewVersion" ma:web="4873beb7-5857-4685-be1f-d57550cc96cc">
+      <xsd:complexType>
+        <xsd:complexContent>
+          <xsd:extension base="dms:MultiChoiceLookup">
+            <xsd:sequence>
+              <xsd:element name="Value" type="dms:Lookup" maxOccurs="unbounded" minOccurs="0" nillable="true"/>
+            </xsd:sequence>
+          </xsd:extension>
+        </xsd:complexContent>
+      </xsd:complexType>
+    </xsd:element>
+    <xsd:element name="LastPublishErrorLookup" ma:index="61" nillable="true" ma:displayName="Last Publish Attempt Error" ma:default="" ma:list="{9E343742-310B-4684-A24C-1D137CB4B230}" ma:internalName="LastPublishErrorLookup" ma:readOnly="true" ma:showField="LastPublishError" ma:web="4873beb7-5857-4685-be1f-d57550cc96cc">
+      <xsd:complexType>
+        <xsd:complexContent>
+          <xsd:extension base="dms:MultiChoiceLookup">
+            <xsd:sequence>
+              <xsd:element name="Value" type="dms:Lookup" maxOccurs="unbounded" minOccurs="0" nillable="true"/>
+            </xsd:sequence>
+          </xsd:extension>
+        </xsd:complexContent>
+      </xsd:complexType>
+    </xsd:element>
+    <xsd:element name="LastPublishResultLookup" ma:index="62" nillable="true" ma:displayName="Last Publish Attempt Result" ma:default="" ma:list="{9E343742-310B-4684-A24C-1D137CB4B230}" ma:internalName="LastPublishResultLookup" ma:readOnly="true" ma:showField="LastPublishResult" ma:web="4873beb7-5857-4685-be1f-d57550cc96cc">
+      <xsd:complexType>
+        <xsd:complexContent>
+          <xsd:extension base="dms:MultiChoiceLookup">
+            <xsd:sequence>
+              <xsd:element name="Value" type="dms:Lookup" maxOccurs="unbounded" minOccurs="0" nillable="true"/>
+            </xsd:sequence>
+          </xsd:extension>
+        </xsd:complexContent>
+      </xsd:complexType>
+    </xsd:element>
+    <xsd:element name="LastPublishAttemptDateLookup" ma:index="63" nillable="true" ma:displayName="Last Publish Attempted On" ma:default="" ma:list="{9E343742-310B-4684-A24C-1D137CB4B230}" ma:internalName="LastPublishAttemptDateLookup" ma:readOnly="true" ma:showField="LastPublishAttemptDate" ma:web="4873beb7-5857-4685-be1f-d57550cc96cc">
+      <xsd:complexType>
+        <xsd:complexContent>
+          <xsd:extension base="dms:MultiChoiceLookup">
+            <xsd:sequence>
+              <xsd:element name="Value" type="dms:Lookup" maxOccurs="unbounded" minOccurs="0" nillable="true"/>
+            </xsd:sequence>
+          </xsd:extension>
+        </xsd:complexContent>
+      </xsd:complexType>
+    </xsd:element>
+    <xsd:element name="LastPublishedByLookup" ma:index="64" nillable="true" ma:displayName="Last Published By" ma:default="" ma:list="{9E343742-310B-4684-A24C-1D137CB4B230}" ma:internalName="LastPublishedByLookup" ma:readOnly="true" ma:showField="LastPublishedBy" ma:web="4873beb7-5857-4685-be1f-d57550cc96cc">
+      <xsd:complexType>
+        <xsd:complexContent>
+          <xsd:extension base="dms:MultiChoiceLookup">
+            <xsd:sequence>
+              <xsd:element name="Value" type="dms:Lookup" maxOccurs="unbounded" minOccurs="0" nillable="true"/>
+            </xsd:sequence>
+          </xsd:extension>
+        </xsd:complexContent>
+      </xsd:complexType>
+    </xsd:element>
+    <xsd:element name="LastPublishTimeLookup" ma:index="65" nillable="true" ma:displayName="Last Published Date" ma:default="" ma:list="{9E343742-310B-4684-A24C-1D137CB4B230}" ma:internalName="LastPublishTimeLookup" ma:readOnly="true" ma:showField="LastPublishTime" ma:web="4873beb7-5857-4685-be1f-d57550cc96cc">
+      <xsd:complexType>
+        <xsd:complexContent>
+          <xsd:extension base="dms:MultiChoiceLookup">
+            <xsd:sequence>
+              <xsd:element name="Value" type="dms:Lookup" maxOccurs="unbounded" minOccurs="0" nillable="true"/>
+            </xsd:sequence>
+          </xsd:extension>
+        </xsd:complexContent>
+      </xsd:complexType>
+    </xsd:element>
+    <xsd:element name="LastPublishVersionLookup" ma:index="66" nillable="true" ma:displayName="Last Published Version" ma:default="" ma:list="{9E343742-310B-4684-A24C-1D137CB4B230}" ma:internalName="LastPublishVersionLookup" ma:readOnly="true" ma:showField="LastPublishVersion" ma:web="4873beb7-5857-4685-be1f-d57550cc96cc">
+      <xsd:complexType>
+        <xsd:complexContent>
+          <xsd:extension base="dms:MultiChoiceLookup">
+            <xsd:sequence>
+              <xsd:element name="Value" type="dms:Lookup" maxOccurs="unbounded" minOccurs="0" nillable="true"/>
+            </xsd:sequence>
+          </xsd:extension>
+        </xsd:complexContent>
+      </xsd:complexType>
+    </xsd:element>
+    <xsd:element name="TPLaunchHelpLinkType" ma:index="67" nillable="true" ma:displayName="Launch Help Link Type" ma:default="Template" ma:internalName="TPLaunchHelpLinkType">
+      <xsd:simpleType>
+        <xsd:restriction base="dms:Choice">
+          <xsd:enumeration value="Template"/>
+          <xsd:enumeration value="Training"/>
+          <xsd:enumeration value="URL"/>
+          <xsd:enumeration value="None"/>
+        </xsd:restriction>
+      </xsd:simpleType>
+    </xsd:element>
+    <xsd:element name="LegacyData" ma:index="68" nillable="true" ma:displayName="Legacy Data" ma:default="" ma:internalName="LegacyData" ma:readOnly="false">
+      <xsd:simpleType>
+        <xsd:restriction base="dms:Note"/>
+      </xsd:simpleType>
+    </xsd:element>
+    <xsd:element name="TPLaunchHelpLink" ma:index="69" nillable="true" ma:displayName="Link to Launch Help Topic" ma:default="" ma:internalName="TPLaunchHelpLink">
+      <xsd:simpleType>
+        <xsd:restriction base="dms:Text"/>
+      </xsd:simpleType>
+    </xsd:element>
+    <xsd:element name="LocComments" ma:index="70" nillable="true" ma:displayName="Loc Approval Comments" ma:default="" ma:internalName="LocComments" ma:readOnly="false">
+      <xsd:simpleType>
+        <xsd:restriction base="dms:Note"/>
+      </xsd:simpleType>
+    </xsd:element>
+    <xsd:element name="LocLastLocAttemptVersionLookup" ma:index="71" nillable="true" ma:displayName="Loc Last Loc Attempt Version" ma:default="" ma:list="{7DD1DCEC-E449-43D3-891F-7DC62F62AD21}" ma:internalName="LocLastLocAttemptVersionLookup" ma:readOnly="false" ma:showField="LastLocAttemptVersion" ma:web="4873beb7-5857-4685-be1f-d57550cc96cc">
+      <xsd:simpleType>
+        <xsd:restriction base="dms:Lookup"/>
+      </xsd:simpleType>
+    </xsd:element>
+    <xsd:element name="LocLastLocAttemptVersionTypeLookup" ma:index="72" nillable="true" ma:displayName="Loc Last Loc Attempt Version Type" ma:default="" ma:list="{7DD1DCEC-E449-43D3-891F-7DC62F62AD21}" ma:internalName="LocLastLocAttemptVersionTypeLookup" ma:readOnly="true" ma:showField="LastLocAttemptVersionType" ma:web="4873beb7-5857-4685-be1f-d57550cc96cc">
+      <xsd:simpleType>
+        <xsd:restriction base="dms:Lookup"/>
+      </xsd:simpleType>
+    </xsd:element>
+    <xsd:element name="LocManualTestRequired" ma:index="73" nillable="true" ma:displayName="Loc Manual Test Required" ma:default="" ma:internalName="LocManualTestRequired" ma:readOnly="false">
+      <xsd:simpleType>
+        <xsd:restriction base="dms:Boolean"/>
+      </xsd:simpleType>
+    </xsd:element>
+    <xsd:element name="LocMarketGroupTiers2" ma:index="74" nillable="true" ma:displayName="Loc Market Group Tiers" ma:internalName="LocMarketGroupTiers2" ma:readOnly="false">
+      <xsd:simpleType>
+        <xsd:restriction base="dms:Unknown"/>
+      </xsd:simpleType>
+    </xsd:element>
+    <xsd:element name="LocNewPublishedVersionLookup" ma:index="75" nillable="true" ma:displayName="Loc New Published Version Lookup" ma:default="" ma:list="{7DD1DCEC-E449-43D3-891F-7DC62F62AD21}" ma:internalName="LocNewPublishedVersionLookup" ma:readOnly="true" ma:showField="NewPublishedVersion" ma:web="4873beb7-5857-4685-be1f-d57550cc96cc">
+      <xsd:simpleType>
+        <xsd:restriction base="dms:Lookup"/>
+      </xsd:simpleType>
+    </xsd:element>
+    <xsd:element name="LocOverallHandbackStatusLookup" ma:index="76" nillable="true" ma:displayName="Loc Overall Handback Status" ma:default="" ma:list="{7DD1DCEC-E449-43D3-891F-7DC62F62AD21}" ma:internalName="LocOverallHandbackStatusLookup" ma:readOnly="true" ma:showField="OverallHandbackStatus" ma:web="4873beb7-5857-4685-be1f-d57550cc96cc">
+      <xsd:simpleType>
+        <xsd:restriction base="dms:Lookup"/>
+      </xsd:simpleType>
+    </xsd:element>
+    <xsd:element name="LocOverallLocStatusLookup" ma:index="77" nillable="true" ma:displayName="Loc Overall Localize Status" ma:default="" ma:list="{7DD1DCEC-E449-43D3-891F-7DC62F62AD21}" ma:internalName="LocOverallLocStatusLookup" ma:readOnly="true" ma:showField="OverallLocStatus" ma:web="4873beb7-5857-4685-be1f-d57550cc96cc">
+      <xsd:simpleType>
+        <xsd:restriction base="dms:Lookup"/>
+      </xsd:simpleType>
+    </xsd:element>
+    <xsd:element name="LocOverallPreviewStatusLookup" ma:index="78" nillable="true" ma:displayName="Loc Overall Preview Status" ma:default="" ma:list="{7DD1DCEC-E449-43D3-891F-7DC62F62AD21}" ma:internalName="LocOverallPreviewStatusLookup" ma:readOnly="true" ma:showField="OverallPreviewStatus" ma:web="4873beb7-5857-4685-be1f-d57550cc96cc">
+      <xsd:simpleType>
+        <xsd:restriction base="dms:Lookup"/>
+      </xsd:simpleType>
+    </xsd:element>
+    <xsd:element name="LocOverallPublishStatusLookup" ma:index="79" nillable="true" ma:displayName="Loc Overall Publish Status" ma:default="" ma:list="{7DD1DCEC-E449-43D3-891F-7DC62F62AD21}" ma:internalName="LocOverallPublishStatusLookup" ma:readOnly="true" ma:showField="OverallPublishStatus" ma:web="4873beb7-5857-4685-be1f-d57550cc96cc">
+      <xsd:simpleType>
+        <xsd:restriction base="dms:Lookup"/>
+      </xsd:simpleType>
+    </xsd:element>
+    <xsd:element name="IntlLocPriority" ma:index="80" nillable="true" ma:displayName="Loc Priority" ma:default="" ma:internalName="IntlLocPriority" ma:readOnly="false">
+      <xsd:simpleType>
+        <xsd:restriction base="dms:Unknown"/>
+      </xsd:simpleType>
+    </xsd:element>
+    <xsd:element name="LocProcessedForHandoffsLookup" ma:index="81" nillable="true" ma:displayName="Loc Processed For Handoffs" ma:default="" ma:list="{7DD1DCEC-E449-43D3-891F-7DC62F62AD21}" ma:internalName="LocProcessedForHandoffsLookup" ma:readOnly="true" ma:showField="ProcessedForHandoffs" ma:web="4873beb7-5857-4685-be1f-d57550cc96cc">
+      <xsd:simpleType>
+        <xsd:restriction base="dms:Lookup"/>
+      </xsd:simpleType>
+    </xsd:element>
+    <xsd:element name="LocProcessedForMarketsLookup" ma:index="82" nillable="true" ma:displayName="Loc Processed For Markets" ma:default="" ma:list="{7DD1DCEC-E449-43D3-891F-7DC62F62AD21}" ma:internalName="LocProcessedForMarketsLookup" ma:readOnly="true" ma:showField="ProcessedForMarkets" ma:web="4873beb7-5857-4685-be1f-d57550cc96cc">
+      <xsd:simpleType>
+        <xsd:restriction base="dms:Lookup"/>
+      </xsd:simpleType>
+    </xsd:element>
+    <xsd:element name="LocPublishedDependentAssetsLookup" ma:index="83" nillable="true" ma:displayName="Loc Published Dependent Assets" ma:default="" ma:list="{7DD1DCEC-E449-43D3-891F-7DC62F62AD21}" ma:internalName="LocPublishedDependentAssetsLookup" ma:readOnly="true" ma:showField="PublishedDependentAssets" ma:web="4873beb7-5857-4685-be1f-d57550cc96cc">
+      <xsd:simpleType>
+        <xsd:restriction base="dms:Lookup"/>
+      </xsd:simpleType>
+    </xsd:element>
+    <xsd:element name="LocPublishedLinkedAssetsLookup" ma:index="84" nillable="true" ma:displayName="Loc Published Linked Assets" ma:default="" ma:list="{7DD1DCEC-E449-43D3-891F-7DC62F62AD21}" ma:internalName="LocPublishedLinkedAssetsLookup" ma:readOnly="true" ma:showField="PublishedLinkedAssets" ma:web="4873beb7-5857-4685-be1f-d57550cc96cc">
+      <xsd:simpleType>
+        <xsd:restriction base="dms:Lookup"/>
+      </xsd:simpleType>
+    </xsd:element>
+    <xsd:element name="LocRecommendedHandoff" ma:index="85" nillable="true" ma:displayName="Loc Recommended Handoff" ma:default="" ma:indexed="true" ma:internalName="LocRecommendedHandoff" ma:readOnly="false">
+      <xsd:simpleType>
+        <xsd:restriction base="dms:Text"/>
+      </xsd:simpleType>
+    </xsd:element>
+    <xsd:element name="LocalizationTagsTaxHTField0" ma:index="87" nillable="true" ma:taxonomy="true" ma:internalName="LocalizationTagsTaxHTField0" ma:taxonomyFieldName="LocalizationTags" ma:displayName="Localization Tags" ma:readOnly="false" ma:default="" ma:fieldId="{00f02cb3-2c7c-424a-9c61-10e9b6878429}" ma:taxonomyMulti="true" ma:sspId="8f79753a-75d3-41f5-8ca3-40b843941b4f" ma:termSetId="5b7703a5-8e8b-4b58-8b31-1cea35331da3" ma:anchorId="00000000-0000-0000-0000-000000000000" ma:open="false" ma:isKeyword="false">
+      <xsd:complexType>
+        <xsd:sequence>
+          <xsd:element ref="pc:Terms" minOccurs="0" maxOccurs="1"/>
+        </xsd:sequence>
+      </xsd:complexType>
+    </xsd:element>
+    <xsd:element name="MachineTranslated" ma:index="88" nillable="true" ma:displayName="Machine Translated" ma:default="" ma:internalName="MachineTranslated" ma:readOnly="false">
+      <xsd:simpleType>
+        <xsd:restriction base="dms:Boolean"/>
+      </xsd:simpleType>
+    </xsd:element>
+    <xsd:element name="Manager" ma:index="89" nillable="true" ma:displayName="Manager" ma:hidden="true" ma:internalName="Manager" ma:readOnly="false">
+      <xsd:simpleType>
+        <xsd:restriction base="dms:Text"/>
+      </xsd:simpleType>
+    </xsd:element>
+    <xsd:element name="Markets" ma:index="90" nillable="true" ma:displayName="Markets" ma:default="" ma:description="Leave blank to show in all markets" ma:list="{2FBD1B11-2ACE-4FDC-B5A3-635D4ADF6F1B}" ma:internalName="Markets" ma:readOnly="false" ma:showField="MarketName" ma:web="4873beb7-5857-4685-be1f-d57550cc96cc">
+      <xsd:complexType>
+        <xsd:complexContent>
+          <xsd:extension base="dms:MultiChoiceLookup">
+            <xsd:sequence>
+              <xsd:element name="Value" type="dms:Lookup" maxOccurs="unbounded" minOccurs="0" nillable="true"/>
+            </xsd:sequence>
+          </xsd:extension>
+        </xsd:complexContent>
+      </xsd:complexType>
+    </xsd:element>
+    <xsd:element name="Milestone" ma:index="91" nillable="true" ma:displayName="Milestone" ma:default="" ma:internalName="Milestone" ma:readOnly="false">
+      <xsd:simpleType>
+        <xsd:restriction base="dms:Unknown"/>
+      </xsd:simpleType>
+    </xsd:element>
+    <xsd:element name="TPNamespace" ma:index="94" nillable="true" ma:displayName="Namespace" ma:default="" ma:internalName="TPNamespace">
+      <xsd:simpleType>
+        <xsd:restriction base="dms:Text"/>
+      </xsd:simpleType>
+    </xsd:element>
+    <xsd:element name="NumericId" ma:index="95" nillable="true" ma:displayName="Numeric ID" ma:default="" ma:indexed="true" ma:internalName="NumericId" ma:readOnly="false">
+      <xsd:simpleType>
+        <xsd:restriction base="dms:Number"/>
+      </xsd:simpleType>
+    </xsd:element>
+    <xsd:element name="NumOfRatingsLookup" ma:index="96" nillable="true" ma:displayName="NumOfRatings" ma:default="" ma:list="{9E343742-310B-4684-A24C-1D137CB4B230}" ma:internalName="NumOfRatingsLookup" ma:readOnly="true" ma:showField="NumOfRatings" ma:web="4873beb7-5857-4685-be1f-d57550cc96cc">
+      <xsd:complexType>
+        <xsd:complexContent>
+          <xsd:extension base="dms:MultiChoiceLookup">
+            <xsd:sequence>
+              <xsd:element name="Value" type="dms:Lookup" maxOccurs="unbounded" minOccurs="0" nillable="true"/>
+            </xsd:sequence>
+          </xsd:extension>
+        </xsd:complexContent>
+      </xsd:complexType>
+    </xsd:element>
+    <xsd:element name="OOCacheId" ma:index="97" nillable="true" ma:displayName="OOCacheId" ma:internalName="OOCacheId" ma:readOnly="false">
+      <xsd:simpleType>
+        <xsd:restriction base="dms:Text"/>
+      </xsd:simpleType>
+    </xsd:element>
+    <xsd:element name="OpenTemplate" ma:index="98" nillable="true" ma:displayName="Open Template" ma:default="true" ma:internalName="OpenTemplate">
+      <xsd:simpleType>
+        <xsd:restriction base="dms:Boolean"/>
+      </xsd:simpleType>
+    </xsd:element>
+    <xsd:element name="OriginAsset" ma:index="99" nillable="true" ma:displayName="Origin Asset" ma:default="" ma:internalName="OriginAsset" ma:readOnly="false">
+      <xsd:simpleType>
+        <xsd:restriction base="dms:Text"/>
+      </xsd:simpleType>
+    </xsd:element>
+    <xsd:element name="OriginalRelease" ma:index="100" nillable="true" ma:displayName="Original Release" ma:default="15" ma:internalName="OriginalRelease" ma:readOnly="false">
+      <xsd:simpleType>
+        <xsd:restriction base="dms:Choice">
+          <xsd:enumeration value="14"/>
+          <xsd:enumeration value="15"/>
+          <xsd:enumeration value="16"/>
+        </xsd:restriction>
+      </xsd:simpleType>
+    </xsd:element>
+    <xsd:element name="OriginalSourceMarket" ma:index="101" nillable="true" ma:displayName="Original Source Market Group" ma:default="" ma:internalName="OriginalSourceMarket" ma:readOnly="false">
+      <xsd:simpleType>
+        <xsd:restriction base="dms:Text"/>
+      </xsd:simpleType>
+    </xsd:element>
+    <xsd:element name="OutputCachingOn" ma:index="102" nillable="true" ma:displayName="Output Caching" ma:default="true" ma:hidden="true" ma:internalName="OutputCachingOn" ma:readOnly="false">
+      <xsd:simpleType>
+        <xsd:restriction base="dms:Boolean"/>
+      </xsd:simpleType>
+    </xsd:element>
+    <xsd:element name="ParentAssetId" ma:index="103" nillable="true" ma:displayName="Parent Asset Id" ma:default="" ma:internalName="ParentAssetId" ma:readOnly="false">
+      <xsd:simpleType>
+        <xsd:restriction base="dms:Text"/>
+      </xsd:simpleType>
+    </xsd:element>
+    <xsd:element name="PlannedPubDate" ma:index="104" nillable="true" ma:displayName="Planned Publish Date" ma:default="" ma:indexed="true" ma:internalName="PlannedPubDate" ma:readOnly="false">
+      <xsd:simpleType>
+        <xsd:restriction base="dms:DateTime"/>
+      </xsd:simpleType>
+    </xsd:element>
+    <xsd:element name="PolicheckWords" ma:index="105" nillable="true" ma:displayName="Policheck Words" ma:default="" ma:internalName="PolicheckWords" ma:readOnly="false">
+      <xsd:simpleType>
+        <xsd:restriction base="dms:Text"/>
+      </xsd:simpleType>
+    </xsd:element>
+    <xsd:element name="BusinessGroup" ma:index="106" nillable="true" ma:displayName="Product Division Owner" ma:default="" ma:internalName="BusinessGroup" ma:readOnly="false">
+      <xsd:simpleType>
+        <xsd:restriction base="dms:Unknown"/>
+      </xsd:simpleType>
+    </xsd:element>
+    <xsd:element name="UAProjectedTotalWords" ma:index="107" nillable="true" ma:displayName="Projected Word Count" ma:default="" ma:internalName="UAProjectedTotalWords" ma:readOnly="false">
+      <xsd:simpleType>
+        <xsd:restriction base="dms:Unknown"/>
+      </xsd:simpleType>
+    </xsd:element>
+    <xsd:element name="Provider" ma:index="108" nillable="true" ma:displayName="Provider" ma:default="" ma:internalName="Provider" ma:readOnly="false">
+      <xsd:simpleType>
+        <xsd:restriction base="dms:Unknown"/>
+      </xsd:simpleType>
+    </xsd:element>
+    <xsd:element name="Providers" ma:index="109" nillable="true" ma:displayName="Providers" ma:default="" ma:internalName="Providers">
+      <xsd:simpleType>
+        <xsd:restriction base="dms:Unknown"/>
+      </xsd:simpleType>
+    </xsd:element>
+    <xsd:element name="PublishStatusLookup" ma:index="110" nillable="true" ma:displayName="Publish Status" ma:default="" ma:list="{9E343742-310B-4684-A24C-1D137CB4B230}" ma:internalName="PublishStatusLookup" ma:readOnly="false" ma:showField="PublishStatus" ma:web="4873beb7-5857-4685-be1f-d57550cc96cc">
+      <xsd:complexType>
+        <xsd:complexContent>
+          <xsd:extension base="dms:MultiChoiceLookup">
+            <xsd:sequence>
+              <xsd:element name="Value" type="dms:Lookup" maxOccurs="unbounded" minOccurs="0" nillable="true"/>
+            </xsd:sequence>
+          </xsd:extension>
+        </xsd:complexContent>
+      </xsd:complexType>
+    </xsd:element>
+    <xsd:element name="PublishTargets" ma:index="111" nillable="true" ma:displayName="Publish Target" ma:default="OfficeOnlineVNext" ma:internalName="PublishTargets" ma:readOnly="false">
+      <xsd:simpleType>
+        <xsd:restriction base="dms:Unknown"/>
+      </xsd:simpleType>
+    </xsd:element>
+    <xsd:element name="RecommendationsModifier" ma:index="112" nillable="true" ma:displayName="Recommendations Modifier" ma:default="" ma:internalName="RecommendationsModifier" ma:readOnly="false">
+      <xsd:simpleType>
+        <xsd:restriction base="dms:Number"/>
+      </xsd:simpleType>
+    </xsd:element>
+    <xsd:element name="ArtSampleDocs" ma:index="113" nillable="true" ma:displayName="Sample Docs" ma:default="" ma:hidden="true" ma:internalName="ArtSampleDocs" ma:readOnly="false">
+      <xsd:simpleType>
+        <xsd:restriction base="dms:Text"/>
+      </xsd:simpleType>
+    </xsd:element>
+    <xsd:element name="ScenarioTagsTaxHTField0" ma:index="115" nillable="true" ma:taxonomy="true" ma:internalName="ScenarioTagsTaxHTField0" ma:taxonomyFieldName="ScenarioTags" ma:displayName="Scenarios" ma:readOnly="false" ma:default="" ma:fieldId="{93aef74d-6c78-4815-8310-51477dceeccc}" ma:taxonomyMulti="true" ma:sspId="8f79753a-75d3-41f5-8ca3-40b843941b4f" ma:termSetId="4b7d5f16-e2f2-4fc0-bab3-6e8b931e57d6" ma:anchorId="00000000-0000-0000-0000-000000000000" ma:open="false" ma:isKeyword="false">
+      <xsd:complexType>
+        <xsd:sequence>
+          <xsd:element ref="pc:Terms" minOccurs="0" maxOccurs="1"/>
+        </xsd:sequence>
+      </xsd:complexType>
+    </xsd:element>
+    <xsd:element name="ShowIn" ma:index="117" nillable="true" ma:displayName="Show In" ma:default="Show everywhere" ma:internalName="ShowIn" ma:readOnly="false">
+      <xsd:simpleType>
+        <xsd:restriction base="dms:Choice">
+          <xsd:enumeration value="Hide on web"/>
+          <xsd:enumeration value="On Web no search"/>
+          <xsd:enumeration value="Show everywhere"/>
+          <xsd:enumeration value="Special use only"/>
+        </xsd:restriction>
+      </xsd:simpleType>
+    </xsd:element>
+    <xsd:element name="SourceTitle" ma:index="118" nillable="true" ma:displayName="Source Title" ma:default="" ma:indexed="true" ma:internalName="SourceTitle" ma:readOnly="false">
+      <xsd:simpleType>
+        <xsd:restriction base="dms:Text"/>
+      </xsd:simpleType>
+    </xsd:element>
+    <xsd:element name="CSXSubmissionDate" ma:index="119" nillable="true" ma:displayName="Submission Date" ma:default="" ma:internalName="CSXSubmissionDate" ma:readOnly="false">
+      <xsd:simpleType>
+        <xsd:restriction base="dms:DateTime"/>
+      </xsd:simpleType>
+    </xsd:element>
+    <xsd:element name="SubmitterId" ma:index="120" nillable="true" ma:displayName="Submitter ID" ma:default="" ma:internalName="SubmitterId" ma:readOnly="false">
+      <xsd:simpleType>
+        <xsd:restriction base="dms:Text"/>
+      </xsd:simpleType>
+    </xsd:element>
+    <xsd:element name="TaxCatchAll" ma:index="121" nillable="true" ma:displayName="Taxonomy Catch All Column" ma:hidden="true" ma:list="{530f955b-6704-4601-bd83-f81d87f1e440}" ma:internalName="TaxCatchAll" ma:showField="CatchAllData" ma:web="4873beb7-5857-4685-be1f-d57550cc96cc">
+      <xsd:complexType>
+        <xsd:complexContent>
+          <xsd:extension base="dms:MultiChoiceLookup">
+            <xsd:sequence>
+              <xsd:element name="Value" type="dms:Lookup" maxOccurs="unbounded" minOccurs="0" nillable="true"/>
+            </xsd:sequence>
+          </xsd:extension>
+        </xsd:complexContent>
+      </xsd:complexType>
+    </xsd:element>
+    <xsd:element name="TaxCatchAllLabel" ma:index="122" nillable="true" ma:displayName="Taxonomy Catch All Column1" ma:hidden="true" ma:list="{530f955b-6704-4601-bd83-f81d87f1e440}" ma:internalName="TaxCatchAllLabel" ma:readOnly="true" ma:showField="CatchAllDataLabel" ma:web="4873beb7-5857-4685-be1f-d57550cc96cc">
+      <xsd:complexType>
+        <xsd:complexContent>
+          <xsd:extension base="dms:MultiChoiceLookup">
+            <xsd:sequence>
+              <xsd:element name="Value" type="dms:Lookup" maxOccurs="unbounded" minOccurs="0" nillable="true"/>
+            </xsd:sequence>
+          </xsd:extension>
+        </xsd:complexContent>
+      </xsd:complexType>
+    </xsd:element>
+    <xsd:element name="TemplateStatus" ma:index="123" nillable="true" ma:displayName="Template Status" ma:default="" ma:internalName="TemplateStatus">
+      <xsd:simpleType>
+        <xsd:restriction base="dms:Unknown"/>
+      </xsd:simpleType>
+    </xsd:element>
+    <xsd:element name="TemplateTemplateType" ma:index="124" nillable="true" ma:displayName="Template Type" ma:default="" ma:internalName="TemplateTemplateType">
+      <xsd:simpleType>
+        <xsd:restriction base="dms:Unknown"/>
+      </xsd:simpleType>
+    </xsd:element>
+    <xsd:element name="ThumbnailAssetId" ma:index="125" nillable="true" ma:displayName="Thumbnail Image Asset" ma:default="" ma:internalName="ThumbnailAssetId" ma:readOnly="false">
+      <xsd:simpleType>
+        <xsd:restriction base="dms:Text"/>
+      </xsd:simpleType>
+    </xsd:element>
+    <xsd:element name="TimesCloned" ma:index="126" nillable="true" ma:displayName="Times Cloned" ma:default="" ma:internalName="TimesCloned" ma:readOnly="false">
+      <xsd:simpleType>
+        <xsd:restriction base="dms:Number"/>
+      </xsd:simpleType>
+    </xsd:element>
+    <xsd:element name="TrustLevel" ma:index="128" nillable="true" ma:displayName="Trust Level" ma:default="1 Microsoft Managed Content" ma:internalName="TrustLevel" ma:readOnly="false">
+      <xsd:simpleType>
+        <xsd:restriction base="dms:Unknown"/>
+      </xsd:simpleType>
+    </xsd:element>
+    <xsd:element name="UALocComments" ma:index="129" nillable="true" ma:displayName="UA Loc Comments" ma:default="" ma:internalName="UALocComments" ma:readOnly="false">
+      <xsd:simpleType>
+        <xsd:restriction base="dms:Note"/>
+      </xsd:simpleType>
+    </xsd:element>
+    <xsd:element name="UALocRecommendation" ma:index="130" nillable="true" ma:displayName="UA Loc Recommendation" ma:default="Localize" ma:internalName="UALocRecommendation" ma:readOnly="false">
+      <xsd:simpleType>
+        <xsd:restriction base="dms:Choice">
+          <xsd:enumeration value="Localize"/>
+          <xsd:enumeration value="Never Localize"/>
+          <xsd:enumeration value="Priority Localize"/>
+        </xsd:restriction>
+      </xsd:simpleType>
+    </xsd:element>
+    <xsd:element name="UANotes" ma:index="131" nillable="true" ma:displayName="UA Notes" ma:default="" ma:internalName="UANotes" ma:readOnly="false">
+      <xsd:simpleType>
+        <xsd:restriction base="dms:Note"/>
+      </xsd:simpleType>
+    </xsd:element>
+    <xsd:element name="TPAppVersion" ma:index="132" nillable="true" ma:displayName="Version" ma:default="" ma:internalName="TPAppVersion">
+      <xsd:simpleType>
+        <xsd:restriction base="dms:Text"/>
+      </xsd:simpleType>
+    </xsd:element>
+    <xsd:element name="VoteCount" ma:index="133" nillable="true" ma:displayName="Vote Count" ma:default="" ma:internalName="VoteCount" ma:readOnly="false">
+      <xsd:simpleType>
+        <xsd:restriction base="dms:Unknown"/>
+      </xsd:simpleType>
+    </xsd:element>
+  </xsd:schema>
+  <xsd:schema xmlns="http://schemas.openxmlformats.org/package/2006/metadata/core-properties" xmlns:xsd="http://www.w3.org/2001/XMLSchema" xmlns:xsi="http://www.w3.org/2001/XMLSchema-instance" xmlns:dc="http://purl.org/dc/elements/1.1/" xmlns:dcterms="http://purl.org/dc/terms/" xmlns:odoc="http://schemas.microsoft.com/internal/obd" targetNamespace="http://schemas.openxmlformats.org/package/2006/metadata/core-properties" elementFormDefault="qualified" attributeFormDefault="unqualified" blockDefault="#all">
+    <xsd:import namespace="http://purl.org/dc/elements/1.1/" schemaLocation="http://dublincore.org/schemas/xmls/qdc/2003/04/02/dc.xsd"/>
+    <xsd:import namespace="http://purl.org/dc/terms/" schemaLocation="http://dublincore.org/schemas/xmls/qdc/2003/04/02/dcterms.xsd"/>
+    <xsd:element name="coreProperties" type="CT_coreProperties"/>
+    <xsd:complexType name="CT_coreProperties">
+      <xsd:all>
+        <xsd:element ref="dc:creator" minOccurs="0" maxOccurs="1"/>
+        <xsd:element ref="dcterms:created" minOccurs="0" maxOccurs="1"/>
+        <xsd:element ref="dc:identifier" minOccurs="0" maxOccurs="1"/>
+        <xsd:element name="contentType" minOccurs="0" maxOccurs="1" type="xsd:string" ma:index="22" ma:displayName="Content Type"/>
+        <xsd:element ref="dc:title" minOccurs="0" maxOccurs="1" ma:index="127" ma:displayName="Title"/>
+        <xsd:element ref="dc:subject" minOccurs="0" maxOccurs="1"/>
+        <xsd:element ref="dc:description" minOccurs="0" maxOccurs="1"/>
+        <xsd:element name="keywords" minOccurs="0" maxOccurs="1" type="xsd:string"/>
+        <xsd:element ref="dc:language" minOccurs="0" maxOccurs="1"/>
+        <xsd:element name="category" minOccurs="0" maxOccurs="1" type="xsd:string"/>
+        <xsd:element name="version" minOccurs="0" maxOccurs="1" type="xsd:string"/>
+        <xsd:element name="revision" minOccurs="0" maxOccurs="1" type="xsd:string">
+          <xsd:annotation>
+            <xsd:documentation>
+                        This value indicates the number of saves or revisions. The application is responsible for updating this value after each revision.
+                    </xsd:documentation>
+          </xsd:annotation>
+        </xsd:element>
+        <xsd:element name="lastModifiedBy" minOccurs="0" maxOccurs="1" type="xsd:string"/>
+        <xsd:element ref="dcterms:modified" minOccurs="0" maxOccurs="1"/>
+        <xsd:element name="contentStatus" minOccurs="0" maxOccurs="1" type="xsd:string"/>
+      </xsd:all>
+    </xsd:complexType>
+  </xsd:schema>
+  <xs:schema xmlns:pc="http://schemas.microsoft.com/office/infopath/2007/PartnerControls" xmlns:xs="http://www.w3.org/2001/XMLSchema" targetNamespace="http://schemas.microsoft.com/office/infopath/2007/PartnerControls" elementFormDefault="qualified" attributeFormDefault="unqualified">
+    <xs:element name="Person">
+      <xs:complexType>
+        <xs:sequence>
+          <xs:element ref="pc:DisplayName" minOccurs="0"/>
+          <xs:element ref="pc:AccountId" minOccurs="0"/>
+          <xs:element ref="pc:AccountType" minOccurs="0"/>
+        </xs:sequence>
+      </xs:complexType>
+    </xs:element>
+    <xs:element name="DisplayName" type="xs:string"/>
+    <xs:element name="AccountId" type="xs:string"/>
+    <xs:element name="AccountType" type="xs:string"/>
+    <xs:element name="BDCAssociatedEntity">
+      <xs:complexType>
+        <xs:sequence>
+          <xs:element ref="pc:BDCEntity" minOccurs="0" maxOccurs="unbounded"/>
+        </xs:sequence>
+        <xs:attribute ref="pc:EntityNamespace"/>
+        <xs:attribute ref="pc:EntityName"/>
+        <xs:attribute ref="pc:SystemInstanceName"/>
+        <xs:attribute ref="pc:AssociationName"/>
+      </xs:complexType>
+    </xs:element>
+    <xs:attribute name="EntityNamespace" type="xs:string"/>
+    <xs:attribute name="EntityName" type="xs:string"/>
+    <xs:attribute name="SystemInstanceName" type="xs:string"/>
+    <xs:attribute name="AssociationName" type="xs:string"/>
+    <xs:element name="BDCEntity">
+      <xs:complexType>
+        <xs:sequence>
+          <xs:element ref="pc:EntityDisplayName" minOccurs="0"/>
+          <xs:element ref="pc:EntityInstanceReference" minOccurs="0"/>
+          <xs:element ref="pc:EntityId1" minOccurs="0"/>
+          <xs:element ref="pc:EntityId2" minOccurs="0"/>
+          <xs:element ref="pc:EntityId3" minOccurs="0"/>
+          <xs:element ref="pc:EntityId4" minOccurs="0"/>
+          <xs:element ref="pc:EntityId5" minOccurs="0"/>
+        </xs:sequence>
+      </xs:complexType>
+    </xs:element>
+    <xs:element name="EntityDisplayName" type="xs:string"/>
+    <xs:element name="EntityInstanceReference" type="xs:string"/>
+    <xs:element name="EntityId1" type="xs:string"/>
+    <xs:element name="EntityId2" type="xs:string"/>
+    <xs:element name="EntityId3" type="xs:string"/>
+    <xs:element name="EntityId4" type="xs:string"/>
+    <xs:element name="EntityId5" type="xs:string"/>
+    <xs:element name="Terms">
+      <xs:complexType>
+        <xs:sequence>
+          <xs:element ref="pc:TermInfo" minOccurs="0" maxOccurs="unbounded"/>
+        </xs:sequence>
+      </xs:complexType>
+    </xs:element>
+    <xs:element name="TermInfo">
+      <xs:complexType>
+        <xs:sequence>
+          <xs:element ref="pc:TermName" minOccurs="0"/>
+          <xs:element ref="pc:TermId" minOccurs="0"/>
+        </xs:sequence>
+      </xs:complexType>
+    </xs:element>
+    <xs:element name="TermName" type="xs:string"/>
+    <xs:element name="TermId" type="xs:string"/>
+  </xs:schema>
+</ct:contentTypeSchema>
 </file>
 
 <file path=customXml/itemProps1.xml><?xml version="1.0" encoding="utf-8"?>
-<ds:datastoreItem xmlns:ds="http://schemas.openxmlformats.org/officeDocument/2006/customXml" ds:itemID="{A09BF4D4-EF60-4196-BFC3-9462D607978C}">
+<ds:datastoreItem xmlns:ds="http://schemas.openxmlformats.org/officeDocument/2006/customXml" ds:itemID="{3836F65B-1B07-41EE-A0E8-BC6EF3855225}">
   <ds:schemaRefs>
-    <ds:schemaRef ds:uri="http://schemas.microsoft.com/office/2006/metadata/contentType"/>
-    <ds:schemaRef ds:uri="http://schemas.microsoft.com/office/2006/metadata/properties/metaAttributes"/>
-    <ds:schemaRef ds:uri="http://www.w3.org/2001/XMLSchema"/>
-    <ds:schemaRef ds:uri="http://schemas.microsoft.com/office/2006/metadata/properties"/>
-    <ds:schemaRef ds:uri="4873beb7-5857-4685-be1f-d57550cc96cc"/>
-    <ds:schemaRef ds:uri="http://schemas.microsoft.com/office/2006/documentManagement/types"/>
-    <ds:schemaRef ds:uri="http://schemas.microsoft.com/office/infopath/2007/PartnerControls"/>
-    <ds:schemaRef ds:uri="http://schemas.openxmlformats.org/package/2006/metadata/core-properties"/>
-    <ds:schemaRef ds:uri="http://purl.org/dc/elements/1.1/"/>
-    <ds:schemaRef ds:uri="http://purl.org/dc/terms/"/>
-    <ds:schemaRef ds:uri="http://schemas.microsoft.com/internal/obd"/>
+    <ds:schemaRef ds:uri="http://schemas.microsoft.com/sharepoint/v3/contenttype/forms"/>
   </ds:schemaRefs>
 </ds:datastoreItem>
 </file>
@@ -8603,9 +8551,19 @@
 </file>
 
 <file path=customXml/itemProps3.xml><?xml version="1.0" encoding="utf-8"?>
-<ds:datastoreItem xmlns:ds="http://schemas.openxmlformats.org/officeDocument/2006/customXml" ds:itemID="{3836F65B-1B07-41EE-A0E8-BC6EF3855225}">
+<ds:datastoreItem xmlns:ds="http://schemas.openxmlformats.org/officeDocument/2006/customXml" ds:itemID="{A09BF4D4-EF60-4196-BFC3-9462D607978C}">
   <ds:schemaRefs>
-    <ds:schemaRef ds:uri="http://schemas.microsoft.com/sharepoint/v3/contenttype/forms"/>
+    <ds:schemaRef ds:uri="http://schemas.microsoft.com/office/2006/metadata/contentType"/>
+    <ds:schemaRef ds:uri="http://schemas.microsoft.com/office/2006/metadata/properties/metaAttributes"/>
+    <ds:schemaRef ds:uri="http://www.w3.org/2001/XMLSchema"/>
+    <ds:schemaRef ds:uri="http://schemas.microsoft.com/office/2006/metadata/properties"/>
+    <ds:schemaRef ds:uri="4873beb7-5857-4685-be1f-d57550cc96cc"/>
+    <ds:schemaRef ds:uri="http://schemas.microsoft.com/office/2006/documentManagement/types"/>
+    <ds:schemaRef ds:uri="http://schemas.microsoft.com/office/infopath/2007/PartnerControls"/>
+    <ds:schemaRef ds:uri="http://schemas.openxmlformats.org/package/2006/metadata/core-properties"/>
+    <ds:schemaRef ds:uri="http://purl.org/dc/elements/1.1/"/>
+    <ds:schemaRef ds:uri="http://purl.org/dc/terms/"/>
+    <ds:schemaRef ds:uri="http://schemas.microsoft.com/internal/obd"/>
   </ds:schemaRefs>
 </ds:datastoreItem>
 </file>
</xml_diff>